<commit_message>
Aggiornamento ppt e inserimento link Utili
</commit_message>
<xml_diff>
--- a/Corso Java.pptx
+++ b/Corso Java.pptx
@@ -90,46 +90,50 @@
     <p:sldId id="334" r:id="rId84"/>
     <p:sldId id="335" r:id="rId85"/>
     <p:sldId id="336" r:id="rId86"/>
-    <p:sldId id="337" r:id="rId87"/>
-    <p:sldId id="338" r:id="rId88"/>
-    <p:sldId id="339" r:id="rId89"/>
-    <p:sldId id="340" r:id="rId90"/>
-    <p:sldId id="341" r:id="rId91"/>
-    <p:sldId id="342" r:id="rId92"/>
-    <p:sldId id="343" r:id="rId93"/>
-    <p:sldId id="344" r:id="rId94"/>
-    <p:sldId id="345" r:id="rId95"/>
-    <p:sldId id="346" r:id="rId96"/>
-    <p:sldId id="347" r:id="rId97"/>
-    <p:sldId id="348" r:id="rId98"/>
-    <p:sldId id="349" r:id="rId99"/>
-    <p:sldId id="351" r:id="rId100"/>
-    <p:sldId id="350" r:id="rId101"/>
-    <p:sldId id="354" r:id="rId102"/>
-    <p:sldId id="355" r:id="rId103"/>
-    <p:sldId id="356" r:id="rId104"/>
-    <p:sldId id="357" r:id="rId105"/>
-    <p:sldId id="358" r:id="rId106"/>
-    <p:sldId id="359" r:id="rId107"/>
-    <p:sldId id="360" r:id="rId108"/>
-    <p:sldId id="361" r:id="rId109"/>
-    <p:sldId id="362" r:id="rId110"/>
-    <p:sldId id="363" r:id="rId111"/>
-    <p:sldId id="364" r:id="rId112"/>
-    <p:sldId id="365" r:id="rId113"/>
-    <p:sldId id="366" r:id="rId114"/>
-    <p:sldId id="367" r:id="rId115"/>
-    <p:sldId id="368" r:id="rId116"/>
-    <p:sldId id="369" r:id="rId117"/>
-    <p:sldId id="370" r:id="rId118"/>
-    <p:sldId id="371" r:id="rId119"/>
-    <p:sldId id="372" r:id="rId120"/>
-    <p:sldId id="373" r:id="rId121"/>
-    <p:sldId id="374" r:id="rId122"/>
-    <p:sldId id="375" r:id="rId123"/>
-    <p:sldId id="376" r:id="rId124"/>
-    <p:sldId id="377" r:id="rId125"/>
-    <p:sldId id="378" r:id="rId126"/>
+    <p:sldId id="381" r:id="rId87"/>
+    <p:sldId id="337" r:id="rId88"/>
+    <p:sldId id="338" r:id="rId89"/>
+    <p:sldId id="339" r:id="rId90"/>
+    <p:sldId id="340" r:id="rId91"/>
+    <p:sldId id="341" r:id="rId92"/>
+    <p:sldId id="342" r:id="rId93"/>
+    <p:sldId id="343" r:id="rId94"/>
+    <p:sldId id="382" r:id="rId95"/>
+    <p:sldId id="344" r:id="rId96"/>
+    <p:sldId id="383" r:id="rId97"/>
+    <p:sldId id="345" r:id="rId98"/>
+    <p:sldId id="346" r:id="rId99"/>
+    <p:sldId id="347" r:id="rId100"/>
+    <p:sldId id="384" r:id="rId101"/>
+    <p:sldId id="348" r:id="rId102"/>
+    <p:sldId id="349" r:id="rId103"/>
+    <p:sldId id="351" r:id="rId104"/>
+    <p:sldId id="350" r:id="rId105"/>
+    <p:sldId id="354" r:id="rId106"/>
+    <p:sldId id="355" r:id="rId107"/>
+    <p:sldId id="356" r:id="rId108"/>
+    <p:sldId id="357" r:id="rId109"/>
+    <p:sldId id="358" r:id="rId110"/>
+    <p:sldId id="359" r:id="rId111"/>
+    <p:sldId id="360" r:id="rId112"/>
+    <p:sldId id="361" r:id="rId113"/>
+    <p:sldId id="362" r:id="rId114"/>
+    <p:sldId id="363" r:id="rId115"/>
+    <p:sldId id="364" r:id="rId116"/>
+    <p:sldId id="365" r:id="rId117"/>
+    <p:sldId id="366" r:id="rId118"/>
+    <p:sldId id="367" r:id="rId119"/>
+    <p:sldId id="368" r:id="rId120"/>
+    <p:sldId id="369" r:id="rId121"/>
+    <p:sldId id="370" r:id="rId122"/>
+    <p:sldId id="371" r:id="rId123"/>
+    <p:sldId id="372" r:id="rId124"/>
+    <p:sldId id="373" r:id="rId125"/>
+    <p:sldId id="374" r:id="rId126"/>
+    <p:sldId id="375" r:id="rId127"/>
+    <p:sldId id="376" r:id="rId128"/>
+    <p:sldId id="377" r:id="rId129"/>
+    <p:sldId id="378" r:id="rId130"/>
   </p:sldIdLst>
   <p:sldSz cx="12192000" cy="6858000"/>
   <p:notesSz cx="6858000" cy="9144000"/>
@@ -12881,7 +12885,7 @@
           <p:cNvPr id="2" name="Titolo 1">
             <a:extLst>
               <a:ext uri="{FF2B5EF4-FFF2-40B4-BE49-F238E27FC236}">
-                <a16:creationId xmlns:a16="http://schemas.microsoft.com/office/drawing/2014/main" id="{A6CF85A1-E457-4832-BCB1-61021474450D}"/>
+                <a16:creationId xmlns:a16="http://schemas.microsoft.com/office/drawing/2014/main" id="{4CA02688-9537-4A52-ADDA-4396414D09C8}"/>
               </a:ext>
             </a:extLst>
           </p:cNvPr>
@@ -12889,62 +12893,56 @@
             <a:spLocks noGrp="1"/>
           </p:cNvSpPr>
           <p:nvPr>
-            <p:ph type="ctrTitle"/>
+            <p:ph type="title"/>
           </p:nvPr>
         </p:nvSpPr>
-        <p:spPr>
-          <a:xfrm>
-            <a:off x="1876423" y="711302"/>
-            <a:ext cx="10103055" cy="656103"/>
-          </a:xfrm>
-        </p:spPr>
-        <p:txBody>
-          <a:bodyPr>
-            <a:noAutofit/>
-          </a:bodyPr>
-          <a:lstStyle/>
-          <a:p>
-            <a:r>
-              <a:rPr lang="it-IT" sz="4300" dirty="0"/>
-              <a:t>Le variabili in java</a:t>
-            </a:r>
-          </a:p>
-        </p:txBody>
-      </p:sp>
-      <p:sp>
-        <p:nvSpPr>
-          <p:cNvPr id="3" name="Sottotitolo 2">
-            <a:extLst>
-              <a:ext uri="{FF2B5EF4-FFF2-40B4-BE49-F238E27FC236}">
-                <a16:creationId xmlns:a16="http://schemas.microsoft.com/office/drawing/2014/main" id="{66409AAA-04C6-4E69-9F24-FBCFD422D4E8}"/>
-              </a:ext>
-            </a:extLst>
-          </p:cNvPr>
-          <p:cNvSpPr>
-            <a:spLocks noGrp="1"/>
-          </p:cNvSpPr>
-          <p:nvPr>
-            <p:ph type="subTitle" idx="1"/>
-          </p:nvPr>
-        </p:nvSpPr>
-        <p:spPr>
-          <a:xfrm>
-            <a:off x="1876425" y="1555124"/>
-            <a:ext cx="9515826" cy="4115834"/>
-          </a:xfrm>
-        </p:spPr>
+        <p:spPr/>
         <p:txBody>
           <a:bodyPr/>
           <a:lstStyle/>
           <a:p>
-            <a:endParaRPr lang="it-IT"/>
+            <a:pPr algn="ctr"/>
+            <a:r>
+              <a:rPr lang="it-IT" dirty="0"/>
+              <a:t>Costruttori</a:t>
+            </a:r>
           </a:p>
         </p:txBody>
       </p:sp>
+      <p:pic>
+        <p:nvPicPr>
+          <p:cNvPr id="4" name="Immagine 3">
+            <a:extLst>
+              <a:ext uri="{FF2B5EF4-FFF2-40B4-BE49-F238E27FC236}">
+                <a16:creationId xmlns:a16="http://schemas.microsoft.com/office/drawing/2014/main" id="{50461DE1-32EC-43BE-9776-6765DA535F8C}"/>
+              </a:ext>
+            </a:extLst>
+          </p:cNvPr>
+          <p:cNvPicPr>
+            <a:picLocks noChangeAspect="1"/>
+          </p:cNvPicPr>
+          <p:nvPr/>
+        </p:nvPicPr>
+        <p:blipFill>
+          <a:blip r:embed="rId2"/>
+          <a:stretch>
+            <a:fillRect/>
+          </a:stretch>
+        </p:blipFill>
+        <p:spPr>
+          <a:xfrm>
+            <a:off x="691387" y="2097088"/>
+            <a:ext cx="11173472" cy="2608441"/>
+          </a:xfrm>
+          <a:prstGeom prst="rect">
+            <a:avLst/>
+          </a:prstGeom>
+        </p:spPr>
+      </p:pic>
     </p:spTree>
     <p:extLst>
       <p:ext uri="{BB962C8B-B14F-4D97-AF65-F5344CB8AC3E}">
-        <p14:creationId xmlns:p14="http://schemas.microsoft.com/office/powerpoint/2010/main" val="1775812485"/>
+        <p14:creationId xmlns:p14="http://schemas.microsoft.com/office/powerpoint/2010/main" val="2244594336"/>
       </p:ext>
     </p:extLst>
   </p:cSld>
@@ -13001,7 +12999,7 @@
           <a:p>
             <a:r>
               <a:rPr lang="it-IT" sz="4300" dirty="0"/>
-              <a:t>Le costanti in java</a:t>
+              <a:t>Utilizzo delle classi di libreria</a:t>
             </a:r>
           </a:p>
         </p:txBody>
@@ -13025,21 +13023,80 @@
         <p:spPr>
           <a:xfrm>
             <a:off x="1876425" y="1555124"/>
-            <a:ext cx="9515826" cy="4115834"/>
+            <a:ext cx="9515826" cy="1365876"/>
           </a:xfrm>
         </p:spPr>
         <p:txBody>
           <a:bodyPr/>
           <a:lstStyle/>
           <a:p>
-            <a:endParaRPr lang="it-IT"/>
+            <a:r>
+              <a:rPr lang="it-IT" dirty="0">
+                <a:solidFill>
+                  <a:schemeClr val="tx1">
+                    <a:lumMod val="95000"/>
+                  </a:schemeClr>
+                </a:solidFill>
+              </a:rPr>
+              <a:t>Il </a:t>
+            </a:r>
+            <a:r>
+              <a:rPr lang="it-IT" dirty="0" err="1">
+                <a:solidFill>
+                  <a:schemeClr val="tx1">
+                    <a:lumMod val="95000"/>
+                  </a:schemeClr>
+                </a:solidFill>
+              </a:rPr>
+              <a:t>jdk</a:t>
+            </a:r>
+            <a:r>
+              <a:rPr lang="it-IT" dirty="0">
+                <a:solidFill>
+                  <a:schemeClr val="tx1">
+                    <a:lumMod val="95000"/>
+                  </a:schemeClr>
+                </a:solidFill>
+              </a:rPr>
+              <a:t> abbiamo detto che contiene un insieme di librerie già sviluppate e pronte all’uso, vediamo di seguito come si importa una di queste librerie ed in seguito si utilizza un suo metodo.</a:t>
+            </a:r>
           </a:p>
         </p:txBody>
       </p:sp>
+      <p:pic>
+        <p:nvPicPr>
+          <p:cNvPr id="5" name="Immagine 4">
+            <a:extLst>
+              <a:ext uri="{FF2B5EF4-FFF2-40B4-BE49-F238E27FC236}">
+                <a16:creationId xmlns:a16="http://schemas.microsoft.com/office/drawing/2014/main" id="{9919B5AF-0617-4184-8AAA-59B4FC7C2646}"/>
+              </a:ext>
+            </a:extLst>
+          </p:cNvPr>
+          <p:cNvPicPr>
+            <a:picLocks noChangeAspect="1"/>
+          </p:cNvPicPr>
+          <p:nvPr/>
+        </p:nvPicPr>
+        <p:blipFill>
+          <a:blip r:embed="rId2"/>
+          <a:stretch>
+            <a:fillRect/>
+          </a:stretch>
+        </p:blipFill>
+        <p:spPr>
+          <a:xfrm>
+            <a:off x="1033725" y="3174483"/>
+            <a:ext cx="10945753" cy="2972215"/>
+          </a:xfrm>
+          <a:prstGeom prst="rect">
+            <a:avLst/>
+          </a:prstGeom>
+        </p:spPr>
+      </p:pic>
     </p:spTree>
     <p:extLst>
       <p:ext uri="{BB962C8B-B14F-4D97-AF65-F5344CB8AC3E}">
-        <p14:creationId xmlns:p14="http://schemas.microsoft.com/office/powerpoint/2010/main" val="1496653589"/>
+        <p14:creationId xmlns:p14="http://schemas.microsoft.com/office/powerpoint/2010/main" val="737883181"/>
       </p:ext>
     </p:extLst>
   </p:cSld>
@@ -13096,7 +13153,7 @@
           <a:p>
             <a:r>
               <a:rPr lang="it-IT" sz="4300" dirty="0"/>
-              <a:t>Tipologia dei dati in java</a:t>
+              <a:t>Import e concetto di package</a:t>
             </a:r>
           </a:p>
         </p:txBody>
@@ -13127,14 +13184,83 @@
           <a:bodyPr/>
           <a:lstStyle/>
           <a:p>
-            <a:endParaRPr lang="it-IT"/>
+            <a:r>
+              <a:rPr lang="it-IT" dirty="0">
+                <a:solidFill>
+                  <a:schemeClr val="tx1">
+                    <a:lumMod val="95000"/>
+                  </a:schemeClr>
+                </a:solidFill>
+              </a:rPr>
+              <a:t>Come abbiamo visto in precedenza nelle seguenti immagini, è stato utilizzata la parola package, vediamo il perché:</a:t>
+            </a:r>
           </a:p>
         </p:txBody>
       </p:sp>
+      <p:pic>
+        <p:nvPicPr>
+          <p:cNvPr id="4" name="Immagine 3">
+            <a:extLst>
+              <a:ext uri="{FF2B5EF4-FFF2-40B4-BE49-F238E27FC236}">
+                <a16:creationId xmlns:a16="http://schemas.microsoft.com/office/drawing/2014/main" id="{138EA3B7-CB4D-4C03-9A84-A386D9E09ED0}"/>
+              </a:ext>
+            </a:extLst>
+          </p:cNvPr>
+          <p:cNvPicPr>
+            <a:picLocks noChangeAspect="1"/>
+          </p:cNvPicPr>
+          <p:nvPr/>
+        </p:nvPicPr>
+        <p:blipFill>
+          <a:blip r:embed="rId2"/>
+          <a:stretch>
+            <a:fillRect/>
+          </a:stretch>
+        </p:blipFill>
+        <p:spPr>
+          <a:xfrm>
+            <a:off x="2214021" y="2481130"/>
+            <a:ext cx="7763958" cy="1895740"/>
+          </a:xfrm>
+          <a:prstGeom prst="rect">
+            <a:avLst/>
+          </a:prstGeom>
+        </p:spPr>
+      </p:pic>
+      <p:pic>
+        <p:nvPicPr>
+          <p:cNvPr id="5" name="Immagine 4">
+            <a:extLst>
+              <a:ext uri="{FF2B5EF4-FFF2-40B4-BE49-F238E27FC236}">
+                <a16:creationId xmlns:a16="http://schemas.microsoft.com/office/drawing/2014/main" id="{3F77DB60-E5BD-4C6B-82F7-DBCA3C510FDD}"/>
+              </a:ext>
+            </a:extLst>
+          </p:cNvPr>
+          <p:cNvPicPr>
+            <a:picLocks noChangeAspect="1"/>
+          </p:cNvPicPr>
+          <p:nvPr/>
+        </p:nvPicPr>
+        <p:blipFill>
+          <a:blip r:embed="rId3"/>
+          <a:stretch>
+            <a:fillRect/>
+          </a:stretch>
+        </p:blipFill>
+        <p:spPr>
+          <a:xfrm>
+            <a:off x="2214021" y="4632588"/>
+            <a:ext cx="7811590" cy="2076740"/>
+          </a:xfrm>
+          <a:prstGeom prst="rect">
+            <a:avLst/>
+          </a:prstGeom>
+        </p:spPr>
+      </p:pic>
     </p:spTree>
     <p:extLst>
       <p:ext uri="{BB962C8B-B14F-4D97-AF65-F5344CB8AC3E}">
-        <p14:creationId xmlns:p14="http://schemas.microsoft.com/office/powerpoint/2010/main" val="979557922"/>
+        <p14:creationId xmlns:p14="http://schemas.microsoft.com/office/powerpoint/2010/main" val="2033361500"/>
       </p:ext>
     </p:extLst>
   </p:cSld>
@@ -13166,7 +13292,7 @@
           <p:cNvPr id="2" name="Titolo 1">
             <a:extLst>
               <a:ext uri="{FF2B5EF4-FFF2-40B4-BE49-F238E27FC236}">
-                <a16:creationId xmlns:a16="http://schemas.microsoft.com/office/drawing/2014/main" id="{A6CF85A1-E457-4832-BCB1-61021474450D}"/>
+                <a16:creationId xmlns:a16="http://schemas.microsoft.com/office/drawing/2014/main" id="{C6753786-AD29-4A88-AC1C-11AC3057D22C}"/>
               </a:ext>
             </a:extLst>
           </p:cNvPr>
@@ -13177,29 +13303,15 @@
             <p:ph type="ctrTitle"/>
           </p:nvPr>
         </p:nvSpPr>
-        <p:spPr>
-          <a:xfrm>
-            <a:off x="1876423" y="711302"/>
-            <a:ext cx="10103055" cy="656103"/>
-          </a:xfrm>
-        </p:spPr>
+        <p:spPr/>
         <p:txBody>
-          <a:bodyPr>
-            <a:noAutofit/>
-          </a:bodyPr>
+          <a:bodyPr/>
           <a:lstStyle/>
           <a:p>
-            <a:r>
-              <a:rPr lang="it-IT" sz="4300" dirty="0"/>
-              <a:t>I </a:t>
-            </a:r>
-            <a:r>
-              <a:rPr lang="it-IT" sz="4300" dirty="0" err="1"/>
-              <a:t>wrapprer</a:t>
-            </a:r>
-            <a:r>
-              <a:rPr lang="it-IT" sz="4300" dirty="0"/>
-              <a:t> in java</a:t>
+            <a:pPr algn="r"/>
+            <a:r>
+              <a:rPr lang="it-IT" dirty="0"/>
+              <a:t>Unit 3</a:t>
             </a:r>
           </a:p>
         </p:txBody>
@@ -13209,7 +13321,7 @@
           <p:cNvPr id="3" name="Sottotitolo 2">
             <a:extLst>
               <a:ext uri="{FF2B5EF4-FFF2-40B4-BE49-F238E27FC236}">
-                <a16:creationId xmlns:a16="http://schemas.microsoft.com/office/drawing/2014/main" id="{66409AAA-04C6-4E69-9F24-FBCFD422D4E8}"/>
+                <a16:creationId xmlns:a16="http://schemas.microsoft.com/office/drawing/2014/main" id="{E3812A85-7B93-4D44-9999-B5293FB9C3EA}"/>
               </a:ext>
             </a:extLst>
           </p:cNvPr>
@@ -13220,24 +13332,49 @@
             <p:ph type="subTitle" idx="1"/>
           </p:nvPr>
         </p:nvSpPr>
-        <p:spPr>
-          <a:xfrm>
-            <a:off x="1876425" y="1555124"/>
-            <a:ext cx="9515826" cy="4115834"/>
-          </a:xfrm>
-        </p:spPr>
+        <p:spPr/>
         <p:txBody>
           <a:bodyPr/>
           <a:lstStyle/>
           <a:p>
-            <a:endParaRPr lang="it-IT"/>
+            <a:pPr algn="r"/>
+            <a:r>
+              <a:rPr lang="it-IT" dirty="0">
+                <a:solidFill>
+                  <a:schemeClr val="tx1">
+                    <a:lumMod val="95000"/>
+                  </a:schemeClr>
+                </a:solidFill>
+              </a:rPr>
+              <a:t>Linguaggi di programmazione, la </a:t>
+            </a:r>
+            <a:r>
+              <a:rPr lang="it-IT" dirty="0" err="1">
+                <a:solidFill>
+                  <a:schemeClr val="tx1">
+                    <a:lumMod val="95000"/>
+                  </a:schemeClr>
+                </a:solidFill>
+              </a:rPr>
+              <a:t>oop</a:t>
+            </a:r>
+            <a:r>
+              <a:rPr lang="it-IT" dirty="0">
+                <a:solidFill>
+                  <a:schemeClr val="tx1">
+                    <a:lumMod val="95000"/>
+                  </a:schemeClr>
+                </a:solidFill>
+              </a:rPr>
+              <a:t> e java parte 2</a:t>
+            </a:r>
           </a:p>
         </p:txBody>
       </p:sp>
     </p:spTree>
     <p:extLst>
       <p:ext uri="{BB962C8B-B14F-4D97-AF65-F5344CB8AC3E}">
-        <p14:creationId xmlns:p14="http://schemas.microsoft.com/office/powerpoint/2010/main" val="2567033275"/>
+        <p14:creationId xmlns:p14="http://schemas.microsoft.com/office/powerpoint/2010/main" val="1034672837"/>
       </p:ext>
     </p:extLst>
   </p:cSld>
@@ -13294,7 +13431,7 @@
           <a:p>
             <a:r>
               <a:rPr lang="it-IT" sz="4300" dirty="0"/>
-              <a:t>Tipologia di variabili e scope</a:t>
+              <a:t>Le variabili in java</a:t>
             </a:r>
           </a:p>
         </p:txBody>
@@ -13325,14 +13462,65 @@
           <a:bodyPr/>
           <a:lstStyle/>
           <a:p>
-            <a:endParaRPr lang="it-IT"/>
+            <a:r>
+              <a:rPr lang="it-IT" dirty="0">
+                <a:solidFill>
+                  <a:schemeClr val="tx1">
+                    <a:lumMod val="95000"/>
+                  </a:schemeClr>
+                </a:solidFill>
+              </a:rPr>
+              <a:t>Le variabili possono essere identificate come uno spazio di memoria al quale viene assegnato un nome ed un tipo di dato accettato.</a:t>
+            </a:r>
+          </a:p>
+          <a:p>
+            <a:r>
+              <a:rPr lang="it-IT" dirty="0">
+                <a:solidFill>
+                  <a:schemeClr val="tx1">
+                    <a:lumMod val="95000"/>
+                  </a:schemeClr>
+                </a:solidFill>
+              </a:rPr>
+              <a:t>Vediamo un loro utilizzo di seguito:</a:t>
+            </a:r>
           </a:p>
         </p:txBody>
       </p:sp>
+      <p:pic>
+        <p:nvPicPr>
+          <p:cNvPr id="4" name="Immagine 3">
+            <a:extLst>
+              <a:ext uri="{FF2B5EF4-FFF2-40B4-BE49-F238E27FC236}">
+                <a16:creationId xmlns:a16="http://schemas.microsoft.com/office/drawing/2014/main" id="{08876352-F7F8-41D3-900D-123E32BE75A6}"/>
+              </a:ext>
+            </a:extLst>
+          </p:cNvPr>
+          <p:cNvPicPr>
+            <a:picLocks noChangeAspect="1"/>
+          </p:cNvPicPr>
+          <p:nvPr/>
+        </p:nvPicPr>
+        <p:blipFill>
+          <a:blip r:embed="rId2"/>
+          <a:stretch>
+            <a:fillRect/>
+          </a:stretch>
+        </p:blipFill>
+        <p:spPr>
+          <a:xfrm>
+            <a:off x="1033725" y="3267462"/>
+            <a:ext cx="10945753" cy="2972215"/>
+          </a:xfrm>
+          <a:prstGeom prst="rect">
+            <a:avLst/>
+          </a:prstGeom>
+        </p:spPr>
+      </p:pic>
     </p:spTree>
     <p:extLst>
       <p:ext uri="{BB962C8B-B14F-4D97-AF65-F5344CB8AC3E}">
-        <p14:creationId xmlns:p14="http://schemas.microsoft.com/office/powerpoint/2010/main" val="3689290080"/>
+        <p14:creationId xmlns:p14="http://schemas.microsoft.com/office/powerpoint/2010/main" val="1775812485"/>
       </p:ext>
     </p:extLst>
   </p:cSld>
@@ -13389,7 +13577,7 @@
           <a:p>
             <a:r>
               <a:rPr lang="it-IT" sz="4300" dirty="0"/>
-              <a:t>Le variabili locali</a:t>
+              <a:t>Le costanti in java</a:t>
             </a:r>
           </a:p>
         </p:txBody>
@@ -13412,7 +13600,7 @@
         </p:nvSpPr>
         <p:spPr>
           <a:xfrm>
-            <a:off x="1876425" y="1555124"/>
+            <a:off x="1876423" y="1371083"/>
             <a:ext cx="9515826" cy="4115834"/>
           </a:xfrm>
         </p:spPr>
@@ -13420,14 +13608,89 @@
           <a:bodyPr/>
           <a:lstStyle/>
           <a:p>
-            <a:endParaRPr lang="it-IT"/>
+            <a:r>
+              <a:rPr lang="it-IT" dirty="0">
+                <a:solidFill>
+                  <a:schemeClr val="tx1">
+                    <a:lumMod val="95000"/>
+                  </a:schemeClr>
+                </a:solidFill>
+              </a:rPr>
+              <a:t>Le variabili come dice il loro nome possono avere un contenuto variabile.</a:t>
+            </a:r>
+          </a:p>
+          <a:p>
+            <a:r>
+              <a:rPr lang="it-IT" dirty="0">
+                <a:solidFill>
+                  <a:schemeClr val="tx1">
+                    <a:lumMod val="95000"/>
+                  </a:schemeClr>
+                </a:solidFill>
+              </a:rPr>
+              <a:t>Il contenuto delle variabili può essere modificato durante la fase di elaborazione del programma:</a:t>
+            </a:r>
+          </a:p>
+          <a:p>
+            <a:r>
+              <a:rPr lang="it-IT" dirty="0">
+                <a:solidFill>
+                  <a:schemeClr val="tx1">
+                    <a:lumMod val="95000"/>
+                  </a:schemeClr>
+                </a:solidFill>
+              </a:rPr>
+              <a:t>Esistono invece delle variabili che non possono modificare il proprio valore, queste prendono il nome di costanti.</a:t>
+            </a:r>
+          </a:p>
+          <a:p>
+            <a:r>
+              <a:rPr lang="it-IT" dirty="0">
+                <a:solidFill>
+                  <a:schemeClr val="tx1">
+                    <a:lumMod val="95000"/>
+                  </a:schemeClr>
+                </a:solidFill>
+              </a:rPr>
+              <a:t>Vediamo Un Esempio:</a:t>
+            </a:r>
           </a:p>
         </p:txBody>
       </p:sp>
+      <p:pic>
+        <p:nvPicPr>
+          <p:cNvPr id="5" name="Immagine 4">
+            <a:extLst>
+              <a:ext uri="{FF2B5EF4-FFF2-40B4-BE49-F238E27FC236}">
+                <a16:creationId xmlns:a16="http://schemas.microsoft.com/office/drawing/2014/main" id="{39A0E9A5-8E63-4F41-8D45-8CBCBE1D1B74}"/>
+              </a:ext>
+            </a:extLst>
+          </p:cNvPr>
+          <p:cNvPicPr>
+            <a:picLocks noChangeAspect="1"/>
+          </p:cNvPicPr>
+          <p:nvPr/>
+        </p:nvPicPr>
+        <p:blipFill>
+          <a:blip r:embed="rId2"/>
+          <a:stretch>
+            <a:fillRect/>
+          </a:stretch>
+        </p:blipFill>
+        <p:spPr>
+          <a:xfrm>
+            <a:off x="1210529" y="4243219"/>
+            <a:ext cx="10507541" cy="2410161"/>
+          </a:xfrm>
+          <a:prstGeom prst="rect">
+            <a:avLst/>
+          </a:prstGeom>
+        </p:spPr>
+      </p:pic>
     </p:spTree>
     <p:extLst>
       <p:ext uri="{BB962C8B-B14F-4D97-AF65-F5344CB8AC3E}">
-        <p14:creationId xmlns:p14="http://schemas.microsoft.com/office/powerpoint/2010/main" val="1086546404"/>
+        <p14:creationId xmlns:p14="http://schemas.microsoft.com/office/powerpoint/2010/main" val="1496653589"/>
       </p:ext>
     </p:extLst>
   </p:cSld>
@@ -13484,7 +13747,7 @@
           <a:p>
             <a:r>
               <a:rPr lang="it-IT" sz="4300" dirty="0"/>
-              <a:t>Le variabili di istanza</a:t>
+              <a:t>Tipologia dei dati in java</a:t>
             </a:r>
           </a:p>
         </p:txBody>
@@ -13523,15 +13786,69 @@
                   </a:schemeClr>
                 </a:solidFill>
               </a:rPr>
-              <a:t>qui</a:t>
+              <a:t>Il tipo di dato è un indicatore che esprime i valori che possono essere accettati da una variabile.</a:t>
+            </a:r>
+          </a:p>
+          <a:p>
+            <a:r>
+              <a:rPr lang="it-IT" dirty="0">
+                <a:solidFill>
+                  <a:schemeClr val="tx1">
+                    <a:lumMod val="95000"/>
+                  </a:schemeClr>
+                </a:solidFill>
+              </a:rPr>
+              <a:t>Vi sono diversi categorie diverse di tipi di dato come i tipi primitivi, tipi di dato strutturato ecc..</a:t>
+            </a:r>
+          </a:p>
+          <a:p>
+            <a:r>
+              <a:rPr lang="it-IT" dirty="0">
+                <a:solidFill>
+                  <a:schemeClr val="tx1">
+                    <a:lumMod val="95000"/>
+                  </a:schemeClr>
+                </a:solidFill>
+              </a:rPr>
+              <a:t>I tipi di dato primitivi sono:</a:t>
             </a:r>
           </a:p>
         </p:txBody>
       </p:sp>
+      <p:pic>
+        <p:nvPicPr>
+          <p:cNvPr id="5" name="Immagine 4">
+            <a:extLst>
+              <a:ext uri="{FF2B5EF4-FFF2-40B4-BE49-F238E27FC236}">
+                <a16:creationId xmlns:a16="http://schemas.microsoft.com/office/drawing/2014/main" id="{CC4B7772-3932-476D-8B13-9C4F128C147A}"/>
+              </a:ext>
+            </a:extLst>
+          </p:cNvPr>
+          <p:cNvPicPr>
+            <a:picLocks noChangeAspect="1"/>
+          </p:cNvPicPr>
+          <p:nvPr/>
+        </p:nvPicPr>
+        <p:blipFill>
+          <a:blip r:embed="rId2"/>
+          <a:stretch>
+            <a:fillRect/>
+          </a:stretch>
+        </p:blipFill>
+        <p:spPr>
+          <a:xfrm>
+            <a:off x="1876423" y="3800319"/>
+            <a:ext cx="9078592" cy="2229161"/>
+          </a:xfrm>
+          <a:prstGeom prst="rect">
+            <a:avLst/>
+          </a:prstGeom>
+        </p:spPr>
+      </p:pic>
     </p:spTree>
     <p:extLst>
       <p:ext uri="{BB962C8B-B14F-4D97-AF65-F5344CB8AC3E}">
-        <p14:creationId xmlns:p14="http://schemas.microsoft.com/office/powerpoint/2010/main" val="2647932667"/>
+        <p14:creationId xmlns:p14="http://schemas.microsoft.com/office/powerpoint/2010/main" val="979557922"/>
       </p:ext>
     </p:extLst>
   </p:cSld>
@@ -13576,7 +13893,7 @@
         </p:nvSpPr>
         <p:spPr>
           <a:xfrm>
-            <a:off x="1876423" y="711302"/>
+            <a:off x="1876425" y="432914"/>
             <a:ext cx="10103055" cy="656103"/>
           </a:xfrm>
         </p:spPr>
@@ -13588,7 +13905,15 @@
           <a:p>
             <a:r>
               <a:rPr lang="it-IT" sz="4300" dirty="0"/>
-              <a:t>Le variabili di classe</a:t>
+              <a:t>I </a:t>
+            </a:r>
+            <a:r>
+              <a:rPr lang="it-IT" sz="4300" dirty="0" err="1"/>
+              <a:t>wrapper</a:t>
+            </a:r>
+            <a:r>
+              <a:rPr lang="it-IT" sz="4300" dirty="0"/>
+              <a:t> in java</a:t>
             </a:r>
           </a:p>
         </p:txBody>
@@ -13611,22 +13936,107 @@
         </p:nvSpPr>
         <p:spPr>
           <a:xfrm>
-            <a:off x="1876425" y="1555124"/>
-            <a:ext cx="9515826" cy="4115834"/>
+            <a:off x="1876424" y="1089017"/>
+            <a:ext cx="10103055" cy="2517783"/>
           </a:xfrm>
         </p:spPr>
         <p:txBody>
-          <a:bodyPr/>
+          <a:bodyPr>
+            <a:normAutofit fontScale="92500" lnSpcReduction="20000"/>
+          </a:bodyPr>
           <a:lstStyle/>
           <a:p>
-            <a:endParaRPr lang="it-IT"/>
+            <a:r>
+              <a:rPr lang="it-IT" dirty="0">
+                <a:solidFill>
+                  <a:schemeClr val="tx1">
+                    <a:lumMod val="95000"/>
+                  </a:schemeClr>
+                </a:solidFill>
+              </a:rPr>
+              <a:t>Abbiamo visto che le variabili sono utilizzate anche per definire gli attributi di una classe, ma questi tipi di dato possono a loro volta identificare una classe?</a:t>
+            </a:r>
+          </a:p>
+          <a:p>
+            <a:r>
+              <a:rPr lang="it-IT" dirty="0">
+                <a:solidFill>
+                  <a:schemeClr val="tx1">
+                    <a:lumMod val="95000"/>
+                  </a:schemeClr>
+                </a:solidFill>
+              </a:rPr>
+              <a:t>La risposta è affermativa, queste classi sono già state definite e sono note con il nome di </a:t>
+            </a:r>
+            <a:r>
+              <a:rPr lang="it-IT" dirty="0" err="1">
+                <a:solidFill>
+                  <a:schemeClr val="tx1">
+                    <a:lumMod val="95000"/>
+                  </a:schemeClr>
+                </a:solidFill>
+              </a:rPr>
+              <a:t>wrapper</a:t>
+            </a:r>
+            <a:r>
+              <a:rPr lang="it-IT" dirty="0">
+                <a:solidFill>
+                  <a:schemeClr val="tx1">
+                    <a:lumMod val="95000"/>
+                  </a:schemeClr>
+                </a:solidFill>
+              </a:rPr>
+              <a:t>. (involucri).</a:t>
+            </a:r>
+          </a:p>
+          <a:p>
+            <a:r>
+              <a:rPr lang="it-IT" dirty="0">
+                <a:solidFill>
+                  <a:schemeClr val="tx1">
+                    <a:lumMod val="95000"/>
+                  </a:schemeClr>
+                </a:solidFill>
+              </a:rPr>
+              <a:t>Questo tipo speciale di classe viene utilizzato per trasformare un semplice numero in un oggetto, questa tecnica in alcuni casi è necessario utilizzare oggetti al posto delle variabili.</a:t>
+            </a:r>
           </a:p>
         </p:txBody>
       </p:sp>
+      <p:pic>
+        <p:nvPicPr>
+          <p:cNvPr id="5" name="Immagine 4">
+            <a:extLst>
+              <a:ext uri="{FF2B5EF4-FFF2-40B4-BE49-F238E27FC236}">
+                <a16:creationId xmlns:a16="http://schemas.microsoft.com/office/drawing/2014/main" id="{C3702712-40FE-4400-890C-BFBB9E0C3955}"/>
+              </a:ext>
+            </a:extLst>
+          </p:cNvPr>
+          <p:cNvPicPr>
+            <a:picLocks noChangeAspect="1"/>
+          </p:cNvPicPr>
+          <p:nvPr/>
+        </p:nvPicPr>
+        <p:blipFill>
+          <a:blip r:embed="rId2"/>
+          <a:stretch>
+            <a:fillRect/>
+          </a:stretch>
+        </p:blipFill>
+        <p:spPr>
+          <a:xfrm>
+            <a:off x="2469827" y="3757051"/>
+            <a:ext cx="8329022" cy="2895600"/>
+          </a:xfrm>
+          <a:prstGeom prst="rect">
+            <a:avLst/>
+          </a:prstGeom>
+        </p:spPr>
+      </p:pic>
     </p:spTree>
     <p:extLst>
       <p:ext uri="{BB962C8B-B14F-4D97-AF65-F5344CB8AC3E}">
-        <p14:creationId xmlns:p14="http://schemas.microsoft.com/office/powerpoint/2010/main" val="171747260"/>
+        <p14:creationId xmlns:p14="http://schemas.microsoft.com/office/powerpoint/2010/main" val="2567033275"/>
       </p:ext>
     </p:extLst>
   </p:cSld>
@@ -13671,23 +14081,19 @@
         </p:nvSpPr>
         <p:spPr>
           <a:xfrm>
-            <a:off x="1876424" y="1256587"/>
-            <a:ext cx="9515826" cy="656103"/>
+            <a:off x="1876423" y="711302"/>
+            <a:ext cx="10103055" cy="656103"/>
           </a:xfrm>
         </p:spPr>
         <p:txBody>
           <a:bodyPr>
-            <a:normAutofit fontScale="90000"/>
+            <a:noAutofit/>
           </a:bodyPr>
           <a:lstStyle/>
           <a:p>
             <a:r>
-              <a:rPr lang="it-IT" dirty="0" err="1"/>
-              <a:t>Literals</a:t>
-            </a:r>
-            <a:r>
-              <a:rPr lang="it-IT" dirty="0"/>
-              <a:t> e codifica di valori numerici e stringhe</a:t>
+              <a:rPr lang="it-IT" sz="4300" dirty="0"/>
+              <a:t>Tipologia di variabili e scope</a:t>
             </a:r>
           </a:p>
         </p:txBody>
@@ -13710,7 +14116,7 @@
         </p:nvSpPr>
         <p:spPr>
           <a:xfrm>
-            <a:off x="1876425" y="2100409"/>
+            <a:off x="1876425" y="1555124"/>
             <a:ext cx="9515826" cy="4115834"/>
           </a:xfrm>
         </p:spPr>
@@ -13718,14 +14124,94 @@
           <a:bodyPr/>
           <a:lstStyle/>
           <a:p>
-            <a:endParaRPr lang="it-IT"/>
+            <a:r>
+              <a:rPr lang="it-IT" dirty="0">
+                <a:solidFill>
+                  <a:schemeClr val="tx1">
+                    <a:lumMod val="95000"/>
+                  </a:schemeClr>
+                </a:solidFill>
+              </a:rPr>
+              <a:t>Nei precedenti esempi abbiamo notato la presenza di alcune parole chiave come Private, public, </a:t>
+            </a:r>
+            <a:r>
+              <a:rPr lang="it-IT" dirty="0" err="1">
+                <a:solidFill>
+                  <a:schemeClr val="tx1">
+                    <a:lumMod val="95000"/>
+                  </a:schemeClr>
+                </a:solidFill>
+              </a:rPr>
+              <a:t>protected</a:t>
+            </a:r>
+            <a:r>
+              <a:rPr lang="it-IT" dirty="0">
+                <a:solidFill>
+                  <a:schemeClr val="tx1">
+                    <a:lumMod val="95000"/>
+                  </a:schemeClr>
+                </a:solidFill>
+              </a:rPr>
+              <a:t>.</a:t>
+            </a:r>
+          </a:p>
+          <a:p>
+            <a:r>
+              <a:rPr lang="it-IT" dirty="0">
+                <a:solidFill>
+                  <a:schemeClr val="tx1">
+                    <a:lumMod val="95000"/>
+                  </a:schemeClr>
+                </a:solidFill>
+              </a:rPr>
+              <a:t>Queste parole chiave identificano la visibilità/raggiungibilità di un costrutto all’interno del file.</a:t>
+            </a:r>
+          </a:p>
+          <a:p>
+            <a:endParaRPr lang="it-IT" dirty="0">
+              <a:solidFill>
+                <a:schemeClr val="tx1">
+                  <a:lumMod val="95000"/>
+                </a:schemeClr>
+              </a:solidFill>
+            </a:endParaRPr>
           </a:p>
         </p:txBody>
       </p:sp>
+      <p:pic>
+        <p:nvPicPr>
+          <p:cNvPr id="5" name="Immagine 4">
+            <a:extLst>
+              <a:ext uri="{FF2B5EF4-FFF2-40B4-BE49-F238E27FC236}">
+                <a16:creationId xmlns:a16="http://schemas.microsoft.com/office/drawing/2014/main" id="{6A6E8C98-34A0-49FE-9502-A202386DEF7B}"/>
+              </a:ext>
+            </a:extLst>
+          </p:cNvPr>
+          <p:cNvPicPr>
+            <a:picLocks noChangeAspect="1"/>
+          </p:cNvPicPr>
+          <p:nvPr/>
+        </p:nvPicPr>
+        <p:blipFill>
+          <a:blip r:embed="rId2"/>
+          <a:stretch>
+            <a:fillRect/>
+          </a:stretch>
+        </p:blipFill>
+        <p:spPr>
+          <a:xfrm>
+            <a:off x="1387349" y="3276621"/>
+            <a:ext cx="9417301" cy="3182965"/>
+          </a:xfrm>
+          <a:prstGeom prst="rect">
+            <a:avLst/>
+          </a:prstGeom>
+        </p:spPr>
+      </p:pic>
     </p:spTree>
     <p:extLst>
       <p:ext uri="{BB962C8B-B14F-4D97-AF65-F5344CB8AC3E}">
-        <p14:creationId xmlns:p14="http://schemas.microsoft.com/office/powerpoint/2010/main" val="517010995"/>
+        <p14:creationId xmlns:p14="http://schemas.microsoft.com/office/powerpoint/2010/main" val="3689290080"/>
       </p:ext>
     </p:extLst>
   </p:cSld>
@@ -13782,7 +14268,7 @@
           <a:p>
             <a:r>
               <a:rPr lang="it-IT" sz="4300" dirty="0"/>
-              <a:t>Il boxing in java</a:t>
+              <a:t>Le variabili locali</a:t>
             </a:r>
           </a:p>
         </p:txBody>
@@ -13813,14 +14299,77 @@
           <a:bodyPr/>
           <a:lstStyle/>
           <a:p>
-            <a:endParaRPr lang="it-IT"/>
+            <a:r>
+              <a:rPr lang="it-IT" dirty="0">
+                <a:solidFill>
+                  <a:schemeClr val="tx1">
+                    <a:lumMod val="95000"/>
+                  </a:schemeClr>
+                </a:solidFill>
+              </a:rPr>
+              <a:t>A DIFFERENZA DELLE VARIABILI PRIVATE, PUBBLICHE E PROTETTE; Le variabili locali vengono viste ed utilizzate solo all’interno di un blocco di codice.</a:t>
+            </a:r>
+          </a:p>
+          <a:p>
+            <a:r>
+              <a:rPr lang="it-IT" dirty="0">
+                <a:solidFill>
+                  <a:schemeClr val="tx1">
+                    <a:lumMod val="95000"/>
+                  </a:schemeClr>
+                </a:solidFill>
+              </a:rPr>
+              <a:t>Per scriverne una basta non inserire il modificatore di visibilità</a:t>
+            </a:r>
+          </a:p>
+          <a:p>
+            <a:r>
+              <a:rPr lang="it-IT" dirty="0">
+                <a:solidFill>
+                  <a:schemeClr val="tx1">
+                    <a:lumMod val="95000"/>
+                  </a:schemeClr>
+                </a:solidFill>
+              </a:rPr>
+              <a:t>Esempio:</a:t>
+            </a:r>
           </a:p>
         </p:txBody>
       </p:sp>
+      <p:pic>
+        <p:nvPicPr>
+          <p:cNvPr id="5" name="Immagine 4">
+            <a:extLst>
+              <a:ext uri="{FF2B5EF4-FFF2-40B4-BE49-F238E27FC236}">
+                <a16:creationId xmlns:a16="http://schemas.microsoft.com/office/drawing/2014/main" id="{39C65308-62D7-41F8-856F-F59AA5D897EF}"/>
+              </a:ext>
+            </a:extLst>
+          </p:cNvPr>
+          <p:cNvPicPr>
+            <a:picLocks noChangeAspect="1"/>
+          </p:cNvPicPr>
+          <p:nvPr/>
+        </p:nvPicPr>
+        <p:blipFill>
+          <a:blip r:embed="rId2"/>
+          <a:stretch>
+            <a:fillRect/>
+          </a:stretch>
+        </p:blipFill>
+        <p:spPr>
+          <a:xfrm>
+            <a:off x="1446763" y="2972199"/>
+            <a:ext cx="9945488" cy="2886478"/>
+          </a:xfrm>
+          <a:prstGeom prst="rect">
+            <a:avLst/>
+          </a:prstGeom>
+        </p:spPr>
+      </p:pic>
     </p:spTree>
     <p:extLst>
       <p:ext uri="{BB962C8B-B14F-4D97-AF65-F5344CB8AC3E}">
-        <p14:creationId xmlns:p14="http://schemas.microsoft.com/office/powerpoint/2010/main" val="1349329975"/>
+        <p14:creationId xmlns:p14="http://schemas.microsoft.com/office/powerpoint/2010/main" val="1086546404"/>
       </p:ext>
     </p:extLst>
   </p:cSld>
@@ -14076,10 +14625,9 @@
           <a:lstStyle/>
           <a:p>
             <a:r>
-              <a:rPr lang="it-IT" sz="4300" dirty="0" err="1"/>
-              <a:t>autoboxing</a:t>
-            </a:r>
-            <a:endParaRPr lang="it-IT" sz="4300" dirty="0"/>
+              <a:rPr lang="it-IT" sz="4300" dirty="0"/>
+              <a:t>Le variabili di istanza</a:t>
+            </a:r>
           </a:p>
         </p:txBody>
       </p:sp>
@@ -14109,14 +14657,53 @@
           <a:bodyPr/>
           <a:lstStyle/>
           <a:p>
-            <a:endParaRPr lang="it-IT"/>
+            <a:r>
+              <a:rPr lang="it-IT" dirty="0">
+                <a:solidFill>
+                  <a:schemeClr val="tx1">
+                    <a:lumMod val="95000"/>
+                  </a:schemeClr>
+                </a:solidFill>
+              </a:rPr>
+              <a:t>Le variabili d’istanza o variabili globali sono delle variabili della quale non è specificata la loro visibilità dichiarate all’esterno dei metodi della classe e quindi disponibili a tutti essi.</a:t>
+            </a:r>
           </a:p>
         </p:txBody>
       </p:sp>
+      <p:pic>
+        <p:nvPicPr>
+          <p:cNvPr id="5" name="Immagine 4">
+            <a:extLst>
+              <a:ext uri="{FF2B5EF4-FFF2-40B4-BE49-F238E27FC236}">
+                <a16:creationId xmlns:a16="http://schemas.microsoft.com/office/drawing/2014/main" id="{29AE681C-C1CA-482E-A8B4-7A1A83638AE4}"/>
+              </a:ext>
+            </a:extLst>
+          </p:cNvPr>
+          <p:cNvPicPr>
+            <a:picLocks noChangeAspect="1"/>
+          </p:cNvPicPr>
+          <p:nvPr/>
+        </p:nvPicPr>
+        <p:blipFill>
+          <a:blip r:embed="rId2"/>
+          <a:stretch>
+            <a:fillRect/>
+          </a:stretch>
+        </p:blipFill>
+        <p:spPr>
+          <a:xfrm>
+            <a:off x="1037131" y="2974745"/>
+            <a:ext cx="10355120" cy="3296110"/>
+          </a:xfrm>
+          <a:prstGeom prst="rect">
+            <a:avLst/>
+          </a:prstGeom>
+        </p:spPr>
+      </p:pic>
     </p:spTree>
     <p:extLst>
       <p:ext uri="{BB962C8B-B14F-4D97-AF65-F5344CB8AC3E}">
-        <p14:creationId xmlns:p14="http://schemas.microsoft.com/office/powerpoint/2010/main" val="423864529"/>
+        <p14:creationId xmlns:p14="http://schemas.microsoft.com/office/powerpoint/2010/main" val="2647932667"/>
       </p:ext>
     </p:extLst>
   </p:cSld>
@@ -14172,10 +14759,9 @@
           <a:lstStyle/>
           <a:p>
             <a:r>
-              <a:rPr lang="it-IT" sz="4300" dirty="0" err="1"/>
-              <a:t>unboxing</a:t>
-            </a:r>
-            <a:endParaRPr lang="it-IT" sz="4300" dirty="0"/>
+              <a:rPr lang="it-IT" sz="4300" dirty="0"/>
+              <a:t>Le variabili di classe</a:t>
+            </a:r>
           </a:p>
         </p:txBody>
       </p:sp>
@@ -14212,7 +14798,7 @@
     </p:spTree>
     <p:extLst>
       <p:ext uri="{BB962C8B-B14F-4D97-AF65-F5344CB8AC3E}">
-        <p14:creationId xmlns:p14="http://schemas.microsoft.com/office/powerpoint/2010/main" val="1886187167"/>
+        <p14:creationId xmlns:p14="http://schemas.microsoft.com/office/powerpoint/2010/main" val="171747260"/>
       </p:ext>
     </p:extLst>
   </p:cSld>
@@ -14257,19 +14843,23 @@
         </p:nvSpPr>
         <p:spPr>
           <a:xfrm>
-            <a:off x="1876423" y="711302"/>
-            <a:ext cx="10103055" cy="656103"/>
+            <a:off x="1876424" y="1256587"/>
+            <a:ext cx="9515826" cy="656103"/>
           </a:xfrm>
         </p:spPr>
         <p:txBody>
           <a:bodyPr>
-            <a:noAutofit/>
+            <a:normAutofit fontScale="90000"/>
           </a:bodyPr>
           <a:lstStyle/>
           <a:p>
             <a:r>
-              <a:rPr lang="it-IT" sz="4300" dirty="0"/>
-              <a:t>casting</a:t>
+              <a:rPr lang="it-IT" dirty="0" err="1"/>
+              <a:t>Literals</a:t>
+            </a:r>
+            <a:r>
+              <a:rPr lang="it-IT" dirty="0"/>
+              <a:t> e codifica di valori numerici e stringhe</a:t>
             </a:r>
           </a:p>
         </p:txBody>
@@ -14292,7 +14882,7 @@
         </p:nvSpPr>
         <p:spPr>
           <a:xfrm>
-            <a:off x="1876425" y="1555124"/>
+            <a:off x="1876425" y="2100409"/>
             <a:ext cx="9515826" cy="4115834"/>
           </a:xfrm>
         </p:spPr>
@@ -14307,7 +14897,7 @@
     </p:spTree>
     <p:extLst>
       <p:ext uri="{BB962C8B-B14F-4D97-AF65-F5344CB8AC3E}">
-        <p14:creationId xmlns:p14="http://schemas.microsoft.com/office/powerpoint/2010/main" val="1710361079"/>
+        <p14:creationId xmlns:p14="http://schemas.microsoft.com/office/powerpoint/2010/main" val="517010995"/>
       </p:ext>
     </p:extLst>
   </p:cSld>
@@ -14364,7 +14954,7 @@
           <a:p>
             <a:r>
               <a:rPr lang="it-IT" sz="4300" dirty="0"/>
-              <a:t>Modificatori di visibilità</a:t>
+              <a:t>Il boxing in java</a:t>
             </a:r>
           </a:p>
         </p:txBody>
@@ -14402,7 +14992,7 @@
     </p:spTree>
     <p:extLst>
       <p:ext uri="{BB962C8B-B14F-4D97-AF65-F5344CB8AC3E}">
-        <p14:creationId xmlns:p14="http://schemas.microsoft.com/office/powerpoint/2010/main" val="2424196560"/>
+        <p14:creationId xmlns:p14="http://schemas.microsoft.com/office/powerpoint/2010/main" val="1349329975"/>
       </p:ext>
     </p:extLst>
   </p:cSld>
@@ -14458,9 +15048,10 @@
           <a:lstStyle/>
           <a:p>
             <a:r>
-              <a:rPr lang="it-IT" sz="4300" dirty="0"/>
-              <a:t>Modificatori di visibilità public</a:t>
-            </a:r>
+              <a:rPr lang="it-IT" sz="4300" dirty="0" err="1"/>
+              <a:t>autoboxing</a:t>
+            </a:r>
+            <a:endParaRPr lang="it-IT" sz="4300" dirty="0"/>
           </a:p>
         </p:txBody>
       </p:sp>
@@ -14497,7 +15088,7 @@
     </p:spTree>
     <p:extLst>
       <p:ext uri="{BB962C8B-B14F-4D97-AF65-F5344CB8AC3E}">
-        <p14:creationId xmlns:p14="http://schemas.microsoft.com/office/powerpoint/2010/main" val="2938427526"/>
+        <p14:creationId xmlns:p14="http://schemas.microsoft.com/office/powerpoint/2010/main" val="423864529"/>
       </p:ext>
     </p:extLst>
   </p:cSld>
@@ -14553,9 +15144,10 @@
           <a:lstStyle/>
           <a:p>
             <a:r>
-              <a:rPr lang="it-IT" sz="4300" dirty="0"/>
-              <a:t>Modificatori di visibilità private</a:t>
-            </a:r>
+              <a:rPr lang="it-IT" sz="4300" dirty="0" err="1"/>
+              <a:t>unboxing</a:t>
+            </a:r>
+            <a:endParaRPr lang="it-IT" sz="4300" dirty="0"/>
           </a:p>
         </p:txBody>
       </p:sp>
@@ -14592,7 +15184,7 @@
     </p:spTree>
     <p:extLst>
       <p:ext uri="{BB962C8B-B14F-4D97-AF65-F5344CB8AC3E}">
-        <p14:creationId xmlns:p14="http://schemas.microsoft.com/office/powerpoint/2010/main" val="970912843"/>
+        <p14:creationId xmlns:p14="http://schemas.microsoft.com/office/powerpoint/2010/main" val="1886187167"/>
       </p:ext>
     </p:extLst>
   </p:cSld>
@@ -14649,13 +15241,8 @@
           <a:p>
             <a:r>
               <a:rPr lang="it-IT" sz="4300" dirty="0"/>
-              <a:t>Modificatori di visibilità </a:t>
-            </a:r>
-            <a:r>
-              <a:rPr lang="it-IT" sz="4300" dirty="0" err="1"/>
-              <a:t>protected</a:t>
-            </a:r>
-            <a:endParaRPr lang="it-IT" sz="4300" dirty="0"/>
+              <a:t>casting</a:t>
+            </a:r>
           </a:p>
         </p:txBody>
       </p:sp>
@@ -14692,7 +15279,7 @@
     </p:spTree>
     <p:extLst>
       <p:ext uri="{BB962C8B-B14F-4D97-AF65-F5344CB8AC3E}">
-        <p14:creationId xmlns:p14="http://schemas.microsoft.com/office/powerpoint/2010/main" val="3215785069"/>
+        <p14:creationId xmlns:p14="http://schemas.microsoft.com/office/powerpoint/2010/main" val="1710361079"/>
       </p:ext>
     </p:extLst>
   </p:cSld>
@@ -14749,7 +15336,7 @@
           <a:p>
             <a:r>
               <a:rPr lang="it-IT" sz="4300" dirty="0"/>
-              <a:t>Modificatori di visibilità default</a:t>
+              <a:t>Modificatori di visibilità</a:t>
             </a:r>
           </a:p>
         </p:txBody>
@@ -14787,7 +15374,7 @@
     </p:spTree>
     <p:extLst>
       <p:ext uri="{BB962C8B-B14F-4D97-AF65-F5344CB8AC3E}">
-        <p14:creationId xmlns:p14="http://schemas.microsoft.com/office/powerpoint/2010/main" val="2247736885"/>
+        <p14:creationId xmlns:p14="http://schemas.microsoft.com/office/powerpoint/2010/main" val="2424196560"/>
       </p:ext>
     </p:extLst>
   </p:cSld>
@@ -14844,7 +15431,7 @@
           <a:p>
             <a:r>
               <a:rPr lang="it-IT" sz="4300" dirty="0"/>
-              <a:t>Definizione di un metodo in java</a:t>
+              <a:t>Modificatori di visibilità public</a:t>
             </a:r>
           </a:p>
         </p:txBody>
@@ -14882,7 +15469,7 @@
     </p:spTree>
     <p:extLst>
       <p:ext uri="{BB962C8B-B14F-4D97-AF65-F5344CB8AC3E}">
-        <p14:creationId xmlns:p14="http://schemas.microsoft.com/office/powerpoint/2010/main" val="4240462642"/>
+        <p14:creationId xmlns:p14="http://schemas.microsoft.com/office/powerpoint/2010/main" val="2938427526"/>
       </p:ext>
     </p:extLst>
   </p:cSld>
@@ -14939,7 +15526,7 @@
           <a:p>
             <a:r>
               <a:rPr lang="it-IT" sz="4300" dirty="0"/>
-              <a:t>I parametri</a:t>
+              <a:t>Modificatori di visibilità private</a:t>
             </a:r>
           </a:p>
         </p:txBody>
@@ -14977,7 +15564,7 @@
     </p:spTree>
     <p:extLst>
       <p:ext uri="{BB962C8B-B14F-4D97-AF65-F5344CB8AC3E}">
-        <p14:creationId xmlns:p14="http://schemas.microsoft.com/office/powerpoint/2010/main" val="3425414071"/>
+        <p14:creationId xmlns:p14="http://schemas.microsoft.com/office/powerpoint/2010/main" val="970912843"/>
       </p:ext>
     </p:extLst>
   </p:cSld>
@@ -15221,8 +15808,13 @@
           <a:p>
             <a:r>
               <a:rPr lang="it-IT" sz="4300" dirty="0"/>
-              <a:t>Richiamare un metodo</a:t>
-            </a:r>
+              <a:t>Modificatori di visibilità </a:t>
+            </a:r>
+            <a:r>
+              <a:rPr lang="it-IT" sz="4300" dirty="0" err="1"/>
+              <a:t>protected</a:t>
+            </a:r>
+            <a:endParaRPr lang="it-IT" sz="4300" dirty="0"/>
           </a:p>
         </p:txBody>
       </p:sp>
@@ -15259,7 +15851,7 @@
     </p:spTree>
     <p:extLst>
       <p:ext uri="{BB962C8B-B14F-4D97-AF65-F5344CB8AC3E}">
-        <p14:creationId xmlns:p14="http://schemas.microsoft.com/office/powerpoint/2010/main" val="457099950"/>
+        <p14:creationId xmlns:p14="http://schemas.microsoft.com/office/powerpoint/2010/main" val="3215785069"/>
       </p:ext>
     </p:extLst>
   </p:cSld>
@@ -15304,26 +15896,19 @@
         </p:nvSpPr>
         <p:spPr>
           <a:xfrm>
-            <a:off x="1876424" y="1256587"/>
-            <a:ext cx="9515826" cy="656103"/>
+            <a:off x="1876423" y="711302"/>
+            <a:ext cx="10103055" cy="656103"/>
           </a:xfrm>
         </p:spPr>
         <p:txBody>
           <a:bodyPr>
-            <a:normAutofit fontScale="90000"/>
+            <a:noAutofit/>
           </a:bodyPr>
           <a:lstStyle/>
           <a:p>
             <a:r>
-              <a:rPr lang="it-IT" dirty="0"/>
-              <a:t>Return ed il valore di ritorno</a:t>
-            </a:r>
-            <a:br>
-              <a:rPr lang="it-IT" dirty="0"/>
-            </a:br>
-            <a:r>
-              <a:rPr lang="it-IT" dirty="0"/>
-              <a:t>del metodo</a:t>
+              <a:rPr lang="it-IT" sz="4300" dirty="0"/>
+              <a:t>Modificatori di visibilità default</a:t>
             </a:r>
           </a:p>
         </p:txBody>
@@ -15346,7 +15931,7 @@
         </p:nvSpPr>
         <p:spPr>
           <a:xfrm>
-            <a:off x="1876425" y="2100409"/>
+            <a:off x="1876425" y="1555124"/>
             <a:ext cx="9515826" cy="4115834"/>
           </a:xfrm>
         </p:spPr>
@@ -15361,7 +15946,7 @@
     </p:spTree>
     <p:extLst>
       <p:ext uri="{BB962C8B-B14F-4D97-AF65-F5344CB8AC3E}">
-        <p14:creationId xmlns:p14="http://schemas.microsoft.com/office/powerpoint/2010/main" val="1664109156"/>
+        <p14:creationId xmlns:p14="http://schemas.microsoft.com/office/powerpoint/2010/main" val="2247736885"/>
       </p:ext>
     </p:extLst>
   </p:cSld>
@@ -15418,7 +16003,7 @@
           <a:p>
             <a:r>
               <a:rPr lang="it-IT" sz="4300" dirty="0"/>
-              <a:t>Signature e la firma dei metodi</a:t>
+              <a:t>Definizione di un metodo in java</a:t>
             </a:r>
           </a:p>
         </p:txBody>
@@ -15456,7 +16041,7 @@
     </p:spTree>
     <p:extLst>
       <p:ext uri="{BB962C8B-B14F-4D97-AF65-F5344CB8AC3E}">
-        <p14:creationId xmlns:p14="http://schemas.microsoft.com/office/powerpoint/2010/main" val="3107471358"/>
+        <p14:creationId xmlns:p14="http://schemas.microsoft.com/office/powerpoint/2010/main" val="4240462642"/>
       </p:ext>
     </p:extLst>
   </p:cSld>
@@ -15513,7 +16098,7 @@
           <a:p>
             <a:r>
               <a:rPr lang="it-IT" sz="4300" dirty="0"/>
-              <a:t>I getter e i setter</a:t>
+              <a:t>I parametri</a:t>
             </a:r>
           </a:p>
         </p:txBody>
@@ -15551,7 +16136,7 @@
     </p:spTree>
     <p:extLst>
       <p:ext uri="{BB962C8B-B14F-4D97-AF65-F5344CB8AC3E}">
-        <p14:creationId xmlns:p14="http://schemas.microsoft.com/office/powerpoint/2010/main" val="2046674380"/>
+        <p14:creationId xmlns:p14="http://schemas.microsoft.com/office/powerpoint/2010/main" val="3425414071"/>
       </p:ext>
     </p:extLst>
   </p:cSld>
@@ -15583,6 +16168,393 @@
           <p:cNvPr id="2" name="Titolo 1">
             <a:extLst>
               <a:ext uri="{FF2B5EF4-FFF2-40B4-BE49-F238E27FC236}">
+                <a16:creationId xmlns:a16="http://schemas.microsoft.com/office/drawing/2014/main" id="{A6CF85A1-E457-4832-BCB1-61021474450D}"/>
+              </a:ext>
+            </a:extLst>
+          </p:cNvPr>
+          <p:cNvSpPr>
+            <a:spLocks noGrp="1"/>
+          </p:cNvSpPr>
+          <p:nvPr>
+            <p:ph type="ctrTitle"/>
+          </p:nvPr>
+        </p:nvSpPr>
+        <p:spPr>
+          <a:xfrm>
+            <a:off x="1876423" y="711302"/>
+            <a:ext cx="10103055" cy="656103"/>
+          </a:xfrm>
+        </p:spPr>
+        <p:txBody>
+          <a:bodyPr>
+            <a:noAutofit/>
+          </a:bodyPr>
+          <a:lstStyle/>
+          <a:p>
+            <a:r>
+              <a:rPr lang="it-IT" sz="4300" dirty="0"/>
+              <a:t>Richiamare un metodo</a:t>
+            </a:r>
+          </a:p>
+        </p:txBody>
+      </p:sp>
+      <p:sp>
+        <p:nvSpPr>
+          <p:cNvPr id="3" name="Sottotitolo 2">
+            <a:extLst>
+              <a:ext uri="{FF2B5EF4-FFF2-40B4-BE49-F238E27FC236}">
+                <a16:creationId xmlns:a16="http://schemas.microsoft.com/office/drawing/2014/main" id="{66409AAA-04C6-4E69-9F24-FBCFD422D4E8}"/>
+              </a:ext>
+            </a:extLst>
+          </p:cNvPr>
+          <p:cNvSpPr>
+            <a:spLocks noGrp="1"/>
+          </p:cNvSpPr>
+          <p:nvPr>
+            <p:ph type="subTitle" idx="1"/>
+          </p:nvPr>
+        </p:nvSpPr>
+        <p:spPr>
+          <a:xfrm>
+            <a:off x="1876425" y="1555124"/>
+            <a:ext cx="9515826" cy="4115834"/>
+          </a:xfrm>
+        </p:spPr>
+        <p:txBody>
+          <a:bodyPr/>
+          <a:lstStyle/>
+          <a:p>
+            <a:endParaRPr lang="it-IT"/>
+          </a:p>
+        </p:txBody>
+      </p:sp>
+    </p:spTree>
+    <p:extLst>
+      <p:ext uri="{BB962C8B-B14F-4D97-AF65-F5344CB8AC3E}">
+        <p14:creationId xmlns:p14="http://schemas.microsoft.com/office/powerpoint/2010/main" val="457099950"/>
+      </p:ext>
+    </p:extLst>
+  </p:cSld>
+  <p:clrMapOvr>
+    <a:masterClrMapping/>
+  </p:clrMapOvr>
+</p:sld>
+</file>
+
+<file path=ppt/slides/slide125.xml><?xml version="1.0" encoding="utf-8"?>
+<p:sld xmlns:a="http://schemas.openxmlformats.org/drawingml/2006/main" xmlns:r="http://schemas.openxmlformats.org/officeDocument/2006/relationships" xmlns:p="http://schemas.openxmlformats.org/presentationml/2006/main">
+  <p:cSld>
+    <p:spTree>
+      <p:nvGrpSpPr>
+        <p:cNvPr id="1" name=""/>
+        <p:cNvGrpSpPr/>
+        <p:nvPr/>
+      </p:nvGrpSpPr>
+      <p:grpSpPr>
+        <a:xfrm>
+          <a:off x="0" y="0"/>
+          <a:ext cx="0" cy="0"/>
+          <a:chOff x="0" y="0"/>
+          <a:chExt cx="0" cy="0"/>
+        </a:xfrm>
+      </p:grpSpPr>
+      <p:sp>
+        <p:nvSpPr>
+          <p:cNvPr id="2" name="Titolo 1">
+            <a:extLst>
+              <a:ext uri="{FF2B5EF4-FFF2-40B4-BE49-F238E27FC236}">
+                <a16:creationId xmlns:a16="http://schemas.microsoft.com/office/drawing/2014/main" id="{A6CF85A1-E457-4832-BCB1-61021474450D}"/>
+              </a:ext>
+            </a:extLst>
+          </p:cNvPr>
+          <p:cNvSpPr>
+            <a:spLocks noGrp="1"/>
+          </p:cNvSpPr>
+          <p:nvPr>
+            <p:ph type="ctrTitle"/>
+          </p:nvPr>
+        </p:nvSpPr>
+        <p:spPr>
+          <a:xfrm>
+            <a:off x="1876424" y="1256587"/>
+            <a:ext cx="9515826" cy="656103"/>
+          </a:xfrm>
+        </p:spPr>
+        <p:txBody>
+          <a:bodyPr>
+            <a:normAutofit fontScale="90000"/>
+          </a:bodyPr>
+          <a:lstStyle/>
+          <a:p>
+            <a:r>
+              <a:rPr lang="it-IT" dirty="0"/>
+              <a:t>Return ed il valore di ritorno</a:t>
+            </a:r>
+            <a:br>
+              <a:rPr lang="it-IT" dirty="0"/>
+            </a:br>
+            <a:r>
+              <a:rPr lang="it-IT" dirty="0"/>
+              <a:t>del metodo</a:t>
+            </a:r>
+          </a:p>
+        </p:txBody>
+      </p:sp>
+      <p:sp>
+        <p:nvSpPr>
+          <p:cNvPr id="3" name="Sottotitolo 2">
+            <a:extLst>
+              <a:ext uri="{FF2B5EF4-FFF2-40B4-BE49-F238E27FC236}">
+                <a16:creationId xmlns:a16="http://schemas.microsoft.com/office/drawing/2014/main" id="{66409AAA-04C6-4E69-9F24-FBCFD422D4E8}"/>
+              </a:ext>
+            </a:extLst>
+          </p:cNvPr>
+          <p:cNvSpPr>
+            <a:spLocks noGrp="1"/>
+          </p:cNvSpPr>
+          <p:nvPr>
+            <p:ph type="subTitle" idx="1"/>
+          </p:nvPr>
+        </p:nvSpPr>
+        <p:spPr>
+          <a:xfrm>
+            <a:off x="1876425" y="2100409"/>
+            <a:ext cx="9515826" cy="4115834"/>
+          </a:xfrm>
+        </p:spPr>
+        <p:txBody>
+          <a:bodyPr/>
+          <a:lstStyle/>
+          <a:p>
+            <a:endParaRPr lang="it-IT"/>
+          </a:p>
+        </p:txBody>
+      </p:sp>
+    </p:spTree>
+    <p:extLst>
+      <p:ext uri="{BB962C8B-B14F-4D97-AF65-F5344CB8AC3E}">
+        <p14:creationId xmlns:p14="http://schemas.microsoft.com/office/powerpoint/2010/main" val="1664109156"/>
+      </p:ext>
+    </p:extLst>
+  </p:cSld>
+  <p:clrMapOvr>
+    <a:masterClrMapping/>
+  </p:clrMapOvr>
+</p:sld>
+</file>
+
+<file path=ppt/slides/slide126.xml><?xml version="1.0" encoding="utf-8"?>
+<p:sld xmlns:a="http://schemas.openxmlformats.org/drawingml/2006/main" xmlns:r="http://schemas.openxmlformats.org/officeDocument/2006/relationships" xmlns:p="http://schemas.openxmlformats.org/presentationml/2006/main">
+  <p:cSld>
+    <p:spTree>
+      <p:nvGrpSpPr>
+        <p:cNvPr id="1" name=""/>
+        <p:cNvGrpSpPr/>
+        <p:nvPr/>
+      </p:nvGrpSpPr>
+      <p:grpSpPr>
+        <a:xfrm>
+          <a:off x="0" y="0"/>
+          <a:ext cx="0" cy="0"/>
+          <a:chOff x="0" y="0"/>
+          <a:chExt cx="0" cy="0"/>
+        </a:xfrm>
+      </p:grpSpPr>
+      <p:sp>
+        <p:nvSpPr>
+          <p:cNvPr id="2" name="Titolo 1">
+            <a:extLst>
+              <a:ext uri="{FF2B5EF4-FFF2-40B4-BE49-F238E27FC236}">
+                <a16:creationId xmlns:a16="http://schemas.microsoft.com/office/drawing/2014/main" id="{A6CF85A1-E457-4832-BCB1-61021474450D}"/>
+              </a:ext>
+            </a:extLst>
+          </p:cNvPr>
+          <p:cNvSpPr>
+            <a:spLocks noGrp="1"/>
+          </p:cNvSpPr>
+          <p:nvPr>
+            <p:ph type="ctrTitle"/>
+          </p:nvPr>
+        </p:nvSpPr>
+        <p:spPr>
+          <a:xfrm>
+            <a:off x="1876423" y="711302"/>
+            <a:ext cx="10103055" cy="656103"/>
+          </a:xfrm>
+        </p:spPr>
+        <p:txBody>
+          <a:bodyPr>
+            <a:noAutofit/>
+          </a:bodyPr>
+          <a:lstStyle/>
+          <a:p>
+            <a:r>
+              <a:rPr lang="it-IT" sz="4300" dirty="0"/>
+              <a:t>Signature e la firma dei metodi</a:t>
+            </a:r>
+          </a:p>
+        </p:txBody>
+      </p:sp>
+      <p:sp>
+        <p:nvSpPr>
+          <p:cNvPr id="3" name="Sottotitolo 2">
+            <a:extLst>
+              <a:ext uri="{FF2B5EF4-FFF2-40B4-BE49-F238E27FC236}">
+                <a16:creationId xmlns:a16="http://schemas.microsoft.com/office/drawing/2014/main" id="{66409AAA-04C6-4E69-9F24-FBCFD422D4E8}"/>
+              </a:ext>
+            </a:extLst>
+          </p:cNvPr>
+          <p:cNvSpPr>
+            <a:spLocks noGrp="1"/>
+          </p:cNvSpPr>
+          <p:nvPr>
+            <p:ph type="subTitle" idx="1"/>
+          </p:nvPr>
+        </p:nvSpPr>
+        <p:spPr>
+          <a:xfrm>
+            <a:off x="1876425" y="1555124"/>
+            <a:ext cx="9515826" cy="4115834"/>
+          </a:xfrm>
+        </p:spPr>
+        <p:txBody>
+          <a:bodyPr/>
+          <a:lstStyle/>
+          <a:p>
+            <a:endParaRPr lang="it-IT"/>
+          </a:p>
+        </p:txBody>
+      </p:sp>
+    </p:spTree>
+    <p:extLst>
+      <p:ext uri="{BB962C8B-B14F-4D97-AF65-F5344CB8AC3E}">
+        <p14:creationId xmlns:p14="http://schemas.microsoft.com/office/powerpoint/2010/main" val="3107471358"/>
+      </p:ext>
+    </p:extLst>
+  </p:cSld>
+  <p:clrMapOvr>
+    <a:masterClrMapping/>
+  </p:clrMapOvr>
+</p:sld>
+</file>
+
+<file path=ppt/slides/slide127.xml><?xml version="1.0" encoding="utf-8"?>
+<p:sld xmlns:a="http://schemas.openxmlformats.org/drawingml/2006/main" xmlns:r="http://schemas.openxmlformats.org/officeDocument/2006/relationships" xmlns:p="http://schemas.openxmlformats.org/presentationml/2006/main">
+  <p:cSld>
+    <p:spTree>
+      <p:nvGrpSpPr>
+        <p:cNvPr id="1" name=""/>
+        <p:cNvGrpSpPr/>
+        <p:nvPr/>
+      </p:nvGrpSpPr>
+      <p:grpSpPr>
+        <a:xfrm>
+          <a:off x="0" y="0"/>
+          <a:ext cx="0" cy="0"/>
+          <a:chOff x="0" y="0"/>
+          <a:chExt cx="0" cy="0"/>
+        </a:xfrm>
+      </p:grpSpPr>
+      <p:sp>
+        <p:nvSpPr>
+          <p:cNvPr id="2" name="Titolo 1">
+            <a:extLst>
+              <a:ext uri="{FF2B5EF4-FFF2-40B4-BE49-F238E27FC236}">
+                <a16:creationId xmlns:a16="http://schemas.microsoft.com/office/drawing/2014/main" id="{A6CF85A1-E457-4832-BCB1-61021474450D}"/>
+              </a:ext>
+            </a:extLst>
+          </p:cNvPr>
+          <p:cNvSpPr>
+            <a:spLocks noGrp="1"/>
+          </p:cNvSpPr>
+          <p:nvPr>
+            <p:ph type="ctrTitle"/>
+          </p:nvPr>
+        </p:nvSpPr>
+        <p:spPr>
+          <a:xfrm>
+            <a:off x="1876423" y="711302"/>
+            <a:ext cx="10103055" cy="656103"/>
+          </a:xfrm>
+        </p:spPr>
+        <p:txBody>
+          <a:bodyPr>
+            <a:noAutofit/>
+          </a:bodyPr>
+          <a:lstStyle/>
+          <a:p>
+            <a:r>
+              <a:rPr lang="it-IT" sz="4300" dirty="0"/>
+              <a:t>I getter e i setter</a:t>
+            </a:r>
+          </a:p>
+        </p:txBody>
+      </p:sp>
+      <p:sp>
+        <p:nvSpPr>
+          <p:cNvPr id="3" name="Sottotitolo 2">
+            <a:extLst>
+              <a:ext uri="{FF2B5EF4-FFF2-40B4-BE49-F238E27FC236}">
+                <a16:creationId xmlns:a16="http://schemas.microsoft.com/office/drawing/2014/main" id="{66409AAA-04C6-4E69-9F24-FBCFD422D4E8}"/>
+              </a:ext>
+            </a:extLst>
+          </p:cNvPr>
+          <p:cNvSpPr>
+            <a:spLocks noGrp="1"/>
+          </p:cNvSpPr>
+          <p:nvPr>
+            <p:ph type="subTitle" idx="1"/>
+          </p:nvPr>
+        </p:nvSpPr>
+        <p:spPr>
+          <a:xfrm>
+            <a:off x="1876425" y="1555124"/>
+            <a:ext cx="9515826" cy="4115834"/>
+          </a:xfrm>
+        </p:spPr>
+        <p:txBody>
+          <a:bodyPr/>
+          <a:lstStyle/>
+          <a:p>
+            <a:endParaRPr lang="it-IT"/>
+          </a:p>
+        </p:txBody>
+      </p:sp>
+    </p:spTree>
+    <p:extLst>
+      <p:ext uri="{BB962C8B-B14F-4D97-AF65-F5344CB8AC3E}">
+        <p14:creationId xmlns:p14="http://schemas.microsoft.com/office/powerpoint/2010/main" val="2046674380"/>
+      </p:ext>
+    </p:extLst>
+  </p:cSld>
+  <p:clrMapOvr>
+    <a:masterClrMapping/>
+  </p:clrMapOvr>
+</p:sld>
+</file>
+
+<file path=ppt/slides/slide128.xml><?xml version="1.0" encoding="utf-8"?>
+<p:sld xmlns:a="http://schemas.openxmlformats.org/drawingml/2006/main" xmlns:r="http://schemas.openxmlformats.org/officeDocument/2006/relationships" xmlns:p="http://schemas.openxmlformats.org/presentationml/2006/main">
+  <p:cSld>
+    <p:spTree>
+      <p:nvGrpSpPr>
+        <p:cNvPr id="1" name=""/>
+        <p:cNvGrpSpPr/>
+        <p:nvPr/>
+      </p:nvGrpSpPr>
+      <p:grpSpPr>
+        <a:xfrm>
+          <a:off x="0" y="0"/>
+          <a:ext cx="0" cy="0"/>
+          <a:chOff x="0" y="0"/>
+          <a:chExt cx="0" cy="0"/>
+        </a:xfrm>
+      </p:grpSpPr>
+      <p:sp>
+        <p:nvSpPr>
+          <p:cNvPr id="2" name="Titolo 1">
+            <a:extLst>
+              <a:ext uri="{FF2B5EF4-FFF2-40B4-BE49-F238E27FC236}">
                 <a16:creationId xmlns:a16="http://schemas.microsoft.com/office/drawing/2014/main" id="{C6753786-AD29-4A88-AC1C-11AC3057D22C}"/>
               </a:ext>
             </a:extLst>
@@ -15655,7 +16627,7 @@
 </p:sld>
 </file>
 
-<file path=ppt/slides/slide125.xml><?xml version="1.0" encoding="utf-8"?>
+<file path=ppt/slides/slide129.xml><?xml version="1.0" encoding="utf-8"?>
 <p:sld xmlns:a="http://schemas.openxmlformats.org/drawingml/2006/main" xmlns:r="http://schemas.openxmlformats.org/officeDocument/2006/relationships" xmlns:p="http://schemas.openxmlformats.org/presentationml/2006/main">
   <p:cSld>
     <p:spTree>
@@ -32252,10 +33224,158 @@
           </a:xfrm>
         </p:spPr>
         <p:txBody>
-          <a:bodyPr/>
+          <a:bodyPr>
+            <a:normAutofit fontScale="62500" lnSpcReduction="20000"/>
+          </a:bodyPr>
           <a:lstStyle/>
           <a:p>
-            <a:endParaRPr lang="it-IT"/>
+            <a:r>
+              <a:rPr lang="it-IT" dirty="0">
+                <a:solidFill>
+                  <a:schemeClr val="tx1">
+                    <a:lumMod val="95000"/>
+                  </a:schemeClr>
+                </a:solidFill>
+              </a:rPr>
+              <a:t>Di seguito una breve lista di parole chiave nel linguaggio java:</a:t>
+            </a:r>
+          </a:p>
+          <a:p>
+            <a:pPr marL="342900" indent="-342900">
+              <a:buFont typeface="Arial" panose="020B0604020202020204" pitchFamily="34" charset="0"/>
+              <a:buChar char="•"/>
+            </a:pPr>
+            <a:r>
+              <a:rPr lang="it-IT" dirty="0">
+                <a:solidFill>
+                  <a:schemeClr val="tx1">
+                    <a:lumMod val="95000"/>
+                  </a:schemeClr>
+                </a:solidFill>
+              </a:rPr>
+              <a:t>Classe: Una classe in java è identificata da un file .java contenente attributi e metodi resi disponibili nel momento in cui una sua istanza viene creata.</a:t>
+            </a:r>
+          </a:p>
+          <a:p>
+            <a:pPr marL="342900" indent="-342900">
+              <a:buFont typeface="Arial" panose="020B0604020202020204" pitchFamily="34" charset="0"/>
+              <a:buChar char="•"/>
+            </a:pPr>
+            <a:r>
+              <a:rPr lang="it-IT" dirty="0">
+                <a:solidFill>
+                  <a:schemeClr val="tx1">
+                    <a:lumMod val="95000"/>
+                  </a:schemeClr>
+                </a:solidFill>
+              </a:rPr>
+              <a:t>Istanza: un istanza di una classe è un entità software caricata in memoria che possiede tutti gli attributi ed i metodi definiti all’interno della classe. In java prende il nome di oggetto.</a:t>
+            </a:r>
+          </a:p>
+          <a:p>
+            <a:pPr marL="342900" indent="-342900">
+              <a:buFont typeface="Arial" panose="020B0604020202020204" pitchFamily="34" charset="0"/>
+              <a:buChar char="•"/>
+            </a:pPr>
+            <a:r>
+              <a:rPr lang="it-IT" dirty="0">
+                <a:solidFill>
+                  <a:schemeClr val="tx1">
+                    <a:lumMod val="95000"/>
+                  </a:schemeClr>
+                </a:solidFill>
+              </a:rPr>
+              <a:t>Oggetto: in java è considerato oggetto  una qualsiasi entità dotata di una propria identità, caratterizzata dalla presenza di attributi e metodi</a:t>
+            </a:r>
+          </a:p>
+          <a:p>
+            <a:pPr marL="342900" indent="-342900">
+              <a:buFont typeface="Arial" panose="020B0604020202020204" pitchFamily="34" charset="0"/>
+              <a:buChar char="•"/>
+            </a:pPr>
+            <a:r>
+              <a:rPr lang="it-IT" dirty="0">
+                <a:solidFill>
+                  <a:schemeClr val="tx1">
+                    <a:lumMod val="95000"/>
+                  </a:schemeClr>
+                </a:solidFill>
+              </a:rPr>
+              <a:t>Blocco di codice: è inteso blocco di codice l’insieme delle istruzioni inserite tra due parentesi graffe {blocco di codice}</a:t>
+            </a:r>
+          </a:p>
+          <a:p>
+            <a:pPr marL="342900" indent="-342900">
+              <a:buFont typeface="Arial" panose="020B0604020202020204" pitchFamily="34" charset="0"/>
+              <a:buChar char="•"/>
+            </a:pPr>
+            <a:r>
+              <a:rPr lang="it-IT" dirty="0">
+                <a:solidFill>
+                  <a:schemeClr val="tx1">
+                    <a:lumMod val="95000"/>
+                  </a:schemeClr>
+                </a:solidFill>
+              </a:rPr>
+              <a:t>Metodo: Un metodo è una sezione di codice definita all’interno di una classe richiamabile attraverso il suo nome nella posizione del programma in cui deve essere eseguita</a:t>
+            </a:r>
+          </a:p>
+          <a:p>
+            <a:pPr marL="342900" indent="-342900">
+              <a:buFont typeface="Arial" panose="020B0604020202020204" pitchFamily="34" charset="0"/>
+              <a:buChar char="•"/>
+            </a:pPr>
+            <a:r>
+              <a:rPr lang="it-IT" dirty="0">
+                <a:solidFill>
+                  <a:schemeClr val="tx1">
+                    <a:lumMod val="95000"/>
+                  </a:schemeClr>
+                </a:solidFill>
+              </a:rPr>
+              <a:t>Parametro: con il termine parametro si intende il dato che deve essere ricevuto da un metodo attraverso una coppia di parentesi tonde.</a:t>
+            </a:r>
+          </a:p>
+          <a:p>
+            <a:pPr marL="342900" indent="-342900">
+              <a:buFont typeface="Arial" panose="020B0604020202020204" pitchFamily="34" charset="0"/>
+              <a:buChar char="•"/>
+            </a:pPr>
+            <a:r>
+              <a:rPr lang="it-IT" dirty="0">
+                <a:solidFill>
+                  <a:schemeClr val="tx1">
+                    <a:lumMod val="95000"/>
+                  </a:schemeClr>
+                </a:solidFill>
+              </a:rPr>
+              <a:t>Eccezione: Un eccezione in un programma java è una situazione anomala segnalata dal compilatore java.</a:t>
+            </a:r>
+          </a:p>
+          <a:p>
+            <a:pPr marL="342900" indent="-342900">
+              <a:buFont typeface="Arial" panose="020B0604020202020204" pitchFamily="34" charset="0"/>
+              <a:buChar char="•"/>
+            </a:pPr>
+            <a:r>
+              <a:rPr lang="it-IT" dirty="0">
+                <a:solidFill>
+                  <a:schemeClr val="tx1">
+                    <a:lumMod val="95000"/>
+                  </a:schemeClr>
+                </a:solidFill>
+              </a:rPr>
+              <a:t>Commento: stringa di codice che non viene letta in fase di esecuzione del programma</a:t>
+            </a:r>
+          </a:p>
+          <a:p>
+            <a:endParaRPr lang="it-IT" dirty="0">
+              <a:solidFill>
+                <a:schemeClr val="tx1">
+                  <a:lumMod val="95000"/>
+                </a:schemeClr>
+              </a:solidFill>
+            </a:endParaRPr>
           </a:p>
         </p:txBody>
       </p:sp>
@@ -32294,7 +33414,7 @@
           <p:cNvPr id="2" name="Titolo 1">
             <a:extLst>
               <a:ext uri="{FF2B5EF4-FFF2-40B4-BE49-F238E27FC236}">
-                <a16:creationId xmlns:a16="http://schemas.microsoft.com/office/drawing/2014/main" id="{A6CF85A1-E457-4832-BCB1-61021474450D}"/>
+                <a16:creationId xmlns:a16="http://schemas.microsoft.com/office/drawing/2014/main" id="{B49C3A71-19F4-4BF0-B2E6-7627ED9D070E}"/>
               </a:ext>
             </a:extLst>
           </p:cNvPr>
@@ -32307,25 +33427,20 @@
         </p:nvSpPr>
         <p:spPr>
           <a:xfrm>
-            <a:off x="1876423" y="711302"/>
-            <a:ext cx="10103055" cy="656103"/>
+            <a:off x="1876424" y="744858"/>
+            <a:ext cx="8791575" cy="672881"/>
           </a:xfrm>
         </p:spPr>
         <p:txBody>
           <a:bodyPr>
-            <a:noAutofit/>
+            <a:normAutofit fontScale="90000"/>
           </a:bodyPr>
           <a:lstStyle/>
           <a:p>
             <a:r>
-              <a:rPr lang="it-IT" sz="4300" dirty="0"/>
-              <a:t>Ide ed ambienti di sviluppo: </a:t>
-            </a:r>
-            <a:r>
-              <a:rPr lang="it-IT" sz="4300" dirty="0" err="1"/>
-              <a:t>eclipse</a:t>
-            </a:r>
-            <a:endParaRPr lang="it-IT" sz="4300" dirty="0"/>
+              <a:rPr lang="it-IT" dirty="0"/>
+              <a:t>Il vocabolario Java (2)</a:t>
+            </a:r>
           </a:p>
         </p:txBody>
       </p:sp>
@@ -32334,7 +33449,7 @@
           <p:cNvPr id="3" name="Sottotitolo 2">
             <a:extLst>
               <a:ext uri="{FF2B5EF4-FFF2-40B4-BE49-F238E27FC236}">
-                <a16:creationId xmlns:a16="http://schemas.microsoft.com/office/drawing/2014/main" id="{66409AAA-04C6-4E69-9F24-FBCFD422D4E8}"/>
+                <a16:creationId xmlns:a16="http://schemas.microsoft.com/office/drawing/2014/main" id="{746C6A53-CECE-4B7B-AE7A-044A91DB9A92}"/>
               </a:ext>
             </a:extLst>
           </p:cNvPr>
@@ -32347,22 +33462,150 @@
         </p:nvSpPr>
         <p:spPr>
           <a:xfrm>
-            <a:off x="1876425" y="1555124"/>
-            <a:ext cx="9515826" cy="4115834"/>
+            <a:off x="1876424" y="1577130"/>
+            <a:ext cx="8791575" cy="3680670"/>
           </a:xfrm>
         </p:spPr>
         <p:txBody>
-          <a:bodyPr/>
+          <a:bodyPr>
+            <a:normAutofit fontScale="92500" lnSpcReduction="10000"/>
+          </a:bodyPr>
           <a:lstStyle/>
           <a:p>
-            <a:endParaRPr lang="it-IT"/>
+            <a:pPr marL="342900" indent="-342900">
+              <a:buFont typeface="Arial" panose="020B0604020202020204" pitchFamily="34" charset="0"/>
+              <a:buChar char="•"/>
+            </a:pPr>
+            <a:r>
+              <a:rPr lang="it-IT" dirty="0">
+                <a:solidFill>
+                  <a:schemeClr val="tx1">
+                    <a:lumMod val="95000"/>
+                  </a:schemeClr>
+                </a:solidFill>
+              </a:rPr>
+              <a:t>Deprecato: parola che identifica una funzione/metodo/classe ecc.. Diventato obsoleto di cui non è garantita l’esistenza in futuro</a:t>
+            </a:r>
+          </a:p>
+          <a:p>
+            <a:pPr marL="342900" indent="-342900">
+              <a:buFont typeface="Arial" panose="020B0604020202020204" pitchFamily="34" charset="0"/>
+              <a:buChar char="•"/>
+            </a:pPr>
+            <a:r>
+              <a:rPr lang="it-IT" dirty="0">
+                <a:solidFill>
+                  <a:schemeClr val="tx1">
+                    <a:lumMod val="95000"/>
+                  </a:schemeClr>
+                </a:solidFill>
+              </a:rPr>
+              <a:t>Espressione: combinazione di operandi e operatori che possono produrre un risultato</a:t>
+            </a:r>
+          </a:p>
+          <a:p>
+            <a:pPr marL="342900" indent="-342900">
+              <a:buFont typeface="Arial" panose="020B0604020202020204" pitchFamily="34" charset="0"/>
+              <a:buChar char="•"/>
+            </a:pPr>
+            <a:r>
+              <a:rPr lang="it-IT" dirty="0">
+                <a:solidFill>
+                  <a:schemeClr val="tx1">
+                    <a:lumMod val="95000"/>
+                  </a:schemeClr>
+                </a:solidFill>
+              </a:rPr>
+              <a:t>Garbage </a:t>
+            </a:r>
+            <a:r>
+              <a:rPr lang="it-IT" dirty="0" err="1">
+                <a:solidFill>
+                  <a:schemeClr val="tx1">
+                    <a:lumMod val="95000"/>
+                  </a:schemeClr>
+                </a:solidFill>
+              </a:rPr>
+              <a:t>collection</a:t>
+            </a:r>
+            <a:r>
+              <a:rPr lang="it-IT" dirty="0">
+                <a:solidFill>
+                  <a:schemeClr val="tx1">
+                    <a:lumMod val="95000"/>
+                  </a:schemeClr>
+                </a:solidFill>
+              </a:rPr>
+              <a:t>: Processo automatico di pulizia della memoria</a:t>
+            </a:r>
+          </a:p>
+          <a:p>
+            <a:pPr marL="342900" indent="-342900">
+              <a:buFont typeface="Arial" panose="020B0604020202020204" pitchFamily="34" charset="0"/>
+              <a:buChar char="•"/>
+            </a:pPr>
+            <a:r>
+              <a:rPr lang="it-IT" dirty="0">
+                <a:solidFill>
+                  <a:schemeClr val="tx1">
+                    <a:lumMod val="95000"/>
+                  </a:schemeClr>
+                </a:solidFill>
+              </a:rPr>
+              <a:t>Gui: Interfaccia grafica</a:t>
+            </a:r>
+          </a:p>
+          <a:p>
+            <a:pPr marL="342900" indent="-342900">
+              <a:buFont typeface="Arial" panose="020B0604020202020204" pitchFamily="34" charset="0"/>
+              <a:buChar char="•"/>
+            </a:pPr>
+            <a:r>
+              <a:rPr lang="it-IT" dirty="0">
+                <a:solidFill>
+                  <a:schemeClr val="tx1">
+                    <a:lumMod val="95000"/>
+                  </a:schemeClr>
+                </a:solidFill>
+              </a:rPr>
+              <a:t>Identificatore: nome assegnato ad una classe, variabile o funzione</a:t>
+            </a:r>
+          </a:p>
+          <a:p>
+            <a:pPr marL="342900" indent="-342900">
+              <a:buFont typeface="Arial" panose="020B0604020202020204" pitchFamily="34" charset="0"/>
+              <a:buChar char="•"/>
+            </a:pPr>
+            <a:r>
+              <a:rPr lang="it-IT" dirty="0">
+                <a:solidFill>
+                  <a:schemeClr val="tx1">
+                    <a:lumMod val="95000"/>
+                  </a:schemeClr>
+                </a:solidFill>
+              </a:rPr>
+              <a:t>Import: dichiarazione che causa l’importazione di package e funzioni esterne al nostro file.</a:t>
+            </a:r>
+          </a:p>
+          <a:p>
+            <a:pPr marL="342900" indent="-342900">
+              <a:buFont typeface="Arial" panose="020B0604020202020204" pitchFamily="34" charset="0"/>
+              <a:buChar char="•"/>
+            </a:pPr>
+            <a:endParaRPr lang="it-IT" dirty="0">
+              <a:solidFill>
+                <a:schemeClr val="tx1">
+                  <a:lumMod val="95000"/>
+                </a:schemeClr>
+              </a:solidFill>
+            </a:endParaRPr>
           </a:p>
         </p:txBody>
       </p:sp>
     </p:spTree>
     <p:extLst>
       <p:ext uri="{BB962C8B-B14F-4D97-AF65-F5344CB8AC3E}">
-        <p14:creationId xmlns:p14="http://schemas.microsoft.com/office/powerpoint/2010/main" val="708801264"/>
+        <p14:creationId xmlns:p14="http://schemas.microsoft.com/office/powerpoint/2010/main" val="808750403"/>
       </p:ext>
     </p:extLst>
   </p:cSld>
@@ -32419,11 +33662,11 @@
           <a:p>
             <a:r>
               <a:rPr lang="it-IT" sz="4300" dirty="0"/>
-              <a:t>Application server: </a:t>
+              <a:t>Ide ed ambienti di sviluppo: </a:t>
             </a:r>
             <a:r>
               <a:rPr lang="it-IT" sz="4300" dirty="0" err="1"/>
-              <a:t>tomcat</a:t>
+              <a:t>eclipse</a:t>
             </a:r>
             <a:endParaRPr lang="it-IT" sz="4300" dirty="0"/>
           </a:p>
@@ -32447,22 +33690,98 @@
         </p:nvSpPr>
         <p:spPr>
           <a:xfrm>
-            <a:off x="1876425" y="1555124"/>
-            <a:ext cx="9515826" cy="4115834"/>
+            <a:off x="1876424" y="1555124"/>
+            <a:ext cx="9297711" cy="4115834"/>
           </a:xfrm>
         </p:spPr>
         <p:txBody>
           <a:bodyPr/>
           <a:lstStyle/>
           <a:p>
-            <a:endParaRPr lang="it-IT"/>
+            <a:pPr algn="just"/>
+            <a:r>
+              <a:rPr lang="it-IT" dirty="0">
+                <a:solidFill>
+                  <a:schemeClr val="tx1">
+                    <a:lumMod val="95000"/>
+                  </a:schemeClr>
+                </a:solidFill>
+              </a:rPr>
+              <a:t>Eclipse è un IDE ovvero un ambiente di sviluppo integrato, questo strumento può essere utilizzato per la produzione di software.</a:t>
+            </a:r>
+          </a:p>
+          <a:p>
+            <a:pPr algn="just"/>
+            <a:r>
+              <a:rPr lang="it-IT" dirty="0">
+                <a:solidFill>
+                  <a:schemeClr val="tx1">
+                    <a:lumMod val="95000"/>
+                  </a:schemeClr>
+                </a:solidFill>
+              </a:rPr>
+              <a:t>Gli ide sono utili nella programmazione perché aiutano </a:t>
+            </a:r>
+            <a:r>
+              <a:rPr lang="it-IT" dirty="0" err="1">
+                <a:solidFill>
+                  <a:schemeClr val="tx1">
+                    <a:lumMod val="95000"/>
+                  </a:schemeClr>
+                </a:solidFill>
+              </a:rPr>
+              <a:t>ilprogrammatore</a:t>
+            </a:r>
+            <a:r>
+              <a:rPr lang="it-IT" dirty="0">
+                <a:solidFill>
+                  <a:schemeClr val="tx1">
+                    <a:lumMod val="95000"/>
+                  </a:schemeClr>
+                </a:solidFill>
+              </a:rPr>
+              <a:t> attraverso l’</a:t>
+            </a:r>
+            <a:r>
+              <a:rPr lang="it-IT" dirty="0" err="1">
+                <a:solidFill>
+                  <a:schemeClr val="tx1">
+                    <a:lumMod val="95000"/>
+                  </a:schemeClr>
+                </a:solidFill>
+              </a:rPr>
+              <a:t>autocompilazione</a:t>
+            </a:r>
+            <a:r>
+              <a:rPr lang="it-IT" dirty="0">
+                <a:solidFill>
+                  <a:schemeClr val="tx1">
+                    <a:lumMod val="95000"/>
+                  </a:schemeClr>
+                </a:solidFill>
+              </a:rPr>
+              <a:t> di porzioni di codice, segnalano allo sviluppatore la maggior parte degli errori , segnala le variabili inutilizzate ecc..</a:t>
+            </a:r>
+          </a:p>
+          <a:p>
+            <a:pPr algn="just"/>
+            <a:r>
+              <a:rPr lang="it-IT" dirty="0">
+                <a:solidFill>
+                  <a:schemeClr val="tx1">
+                    <a:lumMod val="95000"/>
+                  </a:schemeClr>
+                </a:solidFill>
+              </a:rPr>
+              <a:t>Link download: https://www.eclipse.org/downloads/</a:t>
+            </a:r>
           </a:p>
         </p:txBody>
       </p:sp>
     </p:spTree>
     <p:extLst>
       <p:ext uri="{BB962C8B-B14F-4D97-AF65-F5344CB8AC3E}">
-        <p14:creationId xmlns:p14="http://schemas.microsoft.com/office/powerpoint/2010/main" val="1718046108"/>
+        <p14:creationId xmlns:p14="http://schemas.microsoft.com/office/powerpoint/2010/main" val="708801264"/>
       </p:ext>
     </p:extLst>
   </p:cSld>
@@ -32519,19 +33838,11 @@
           <a:p>
             <a:r>
               <a:rPr lang="it-IT" sz="4300" dirty="0"/>
-              <a:t>Build </a:t>
+              <a:t>Application server: </a:t>
             </a:r>
             <a:r>
               <a:rPr lang="it-IT" sz="4300" dirty="0" err="1"/>
-              <a:t>automation</a:t>
-            </a:r>
-            <a:r>
-              <a:rPr lang="it-IT" sz="4300" dirty="0"/>
-              <a:t>: </a:t>
-            </a:r>
-            <a:r>
-              <a:rPr lang="it-IT" sz="4300" dirty="0" err="1"/>
-              <a:t>maven</a:t>
+              <a:t>tomcat</a:t>
             </a:r>
             <a:endParaRPr lang="it-IT" sz="4300" dirty="0"/>
           </a:p>
@@ -32560,17 +33871,133 @@
           </a:xfrm>
         </p:spPr>
         <p:txBody>
-          <a:bodyPr/>
+          <a:bodyPr>
+            <a:normAutofit lnSpcReduction="10000"/>
+          </a:bodyPr>
           <a:lstStyle/>
           <a:p>
-            <a:endParaRPr lang="it-IT"/>
+            <a:r>
+              <a:rPr lang="it-IT" dirty="0">
+                <a:solidFill>
+                  <a:schemeClr val="tx1">
+                    <a:lumMod val="95000"/>
+                  </a:schemeClr>
+                </a:solidFill>
+              </a:rPr>
+              <a:t>Apache </a:t>
+            </a:r>
+            <a:r>
+              <a:rPr lang="it-IT" dirty="0" err="1">
+                <a:solidFill>
+                  <a:schemeClr val="tx1">
+                    <a:lumMod val="95000"/>
+                  </a:schemeClr>
+                </a:solidFill>
+              </a:rPr>
+              <a:t>tomcatè</a:t>
+            </a:r>
+            <a:r>
+              <a:rPr lang="it-IT" dirty="0">
+                <a:solidFill>
+                  <a:schemeClr val="tx1">
+                    <a:lumMod val="95000"/>
+                  </a:schemeClr>
+                </a:solidFill>
+              </a:rPr>
+              <a:t> un server web </a:t>
+            </a:r>
+            <a:r>
+              <a:rPr lang="it-IT" dirty="0" err="1">
+                <a:solidFill>
+                  <a:schemeClr val="tx1">
+                    <a:lumMod val="95000"/>
+                  </a:schemeClr>
+                </a:solidFill>
+              </a:rPr>
+              <a:t>OPEn</a:t>
+            </a:r>
+            <a:r>
+              <a:rPr lang="it-IT" dirty="0">
+                <a:solidFill>
+                  <a:schemeClr val="tx1">
+                    <a:lumMod val="95000"/>
+                  </a:schemeClr>
+                </a:solidFill>
+              </a:rPr>
+              <a:t> source, avviabile dal proprio computer attraverso particolari strumenti.</a:t>
+            </a:r>
+          </a:p>
+          <a:p>
+            <a:r>
+              <a:rPr lang="it-IT" dirty="0">
+                <a:solidFill>
+                  <a:schemeClr val="tx1">
+                    <a:lumMod val="95000"/>
+                  </a:schemeClr>
+                </a:solidFill>
+              </a:rPr>
+              <a:t>Questo tipo di server è particolarmente predisposto per ospitare pagine web scritte in java o applicazioni.</a:t>
+            </a:r>
+          </a:p>
+          <a:p>
+            <a:r>
+              <a:rPr lang="it-IT" dirty="0">
+                <a:solidFill>
+                  <a:schemeClr val="tx1">
+                    <a:lumMod val="95000"/>
+                  </a:schemeClr>
+                </a:solidFill>
+              </a:rPr>
+              <a:t>Tomcat è basato sulla tecnologia JSP (Java server pages) utilizzata per integrare una logica della presentazione di applicazioni web attraverso il linguaggio java e html/xml.</a:t>
+            </a:r>
+          </a:p>
+          <a:p>
+            <a:r>
+              <a:rPr lang="it-IT" dirty="0">
+                <a:solidFill>
+                  <a:schemeClr val="tx1">
+                    <a:lumMod val="95000"/>
+                  </a:schemeClr>
+                </a:solidFill>
+              </a:rPr>
+              <a:t>Questo tipo di server è particolarmente indicato inoltre per le </a:t>
+            </a:r>
+            <a:r>
+              <a:rPr lang="it-IT" dirty="0" err="1">
+                <a:solidFill>
+                  <a:schemeClr val="tx1">
+                    <a:lumMod val="95000"/>
+                  </a:schemeClr>
+                </a:solidFill>
+              </a:rPr>
+              <a:t>servlet</a:t>
+            </a:r>
+            <a:r>
+              <a:rPr lang="it-IT" dirty="0">
+                <a:solidFill>
+                  <a:schemeClr val="tx1">
+                    <a:lumMod val="95000"/>
+                  </a:schemeClr>
+                </a:solidFill>
+              </a:rPr>
+              <a:t>, ovvero oggetti java che operano sul server web, questa tecnologia permette la scrittura di applicazioni web in java</a:t>
+            </a:r>
+          </a:p>
+          <a:p>
+            <a:endParaRPr lang="it-IT" dirty="0">
+              <a:solidFill>
+                <a:schemeClr val="tx1">
+                  <a:lumMod val="95000"/>
+                </a:schemeClr>
+              </a:solidFill>
+            </a:endParaRPr>
           </a:p>
         </p:txBody>
       </p:sp>
     </p:spTree>
     <p:extLst>
       <p:ext uri="{BB962C8B-B14F-4D97-AF65-F5344CB8AC3E}">
-        <p14:creationId xmlns:p14="http://schemas.microsoft.com/office/powerpoint/2010/main" val="1384120757"/>
+        <p14:creationId xmlns:p14="http://schemas.microsoft.com/office/powerpoint/2010/main" val="1718046108"/>
       </p:ext>
     </p:extLst>
   </p:cSld>
@@ -32621,14 +34048,27 @@
         </p:spPr>
         <p:txBody>
           <a:bodyPr>
-            <a:normAutofit/>
+            <a:noAutofit/>
           </a:bodyPr>
           <a:lstStyle/>
           <a:p>
             <a:r>
-              <a:rPr lang="it-IT" sz="4100" dirty="0"/>
-              <a:t>Installazione e configurazione di java</a:t>
-            </a:r>
+              <a:rPr lang="it-IT" sz="4300" dirty="0"/>
+              <a:t>Build </a:t>
+            </a:r>
+            <a:r>
+              <a:rPr lang="it-IT" sz="4300" dirty="0" err="1"/>
+              <a:t>automation</a:t>
+            </a:r>
+            <a:r>
+              <a:rPr lang="it-IT" sz="4300" dirty="0"/>
+              <a:t>: </a:t>
+            </a:r>
+            <a:r>
+              <a:rPr lang="it-IT" sz="4300" dirty="0" err="1"/>
+              <a:t>maven</a:t>
+            </a:r>
+            <a:endParaRPr lang="it-IT" sz="4300" dirty="0"/>
           </a:p>
         </p:txBody>
       </p:sp>
@@ -32658,14 +34098,127 @@
           <a:bodyPr/>
           <a:lstStyle/>
           <a:p>
-            <a:endParaRPr lang="it-IT"/>
+            <a:r>
+              <a:rPr lang="it-IT" dirty="0">
+                <a:solidFill>
+                  <a:schemeClr val="tx1">
+                    <a:lumMod val="95000"/>
+                  </a:schemeClr>
+                </a:solidFill>
+              </a:rPr>
+              <a:t>Per build </a:t>
+            </a:r>
+            <a:r>
+              <a:rPr lang="it-IT" dirty="0" err="1">
+                <a:solidFill>
+                  <a:schemeClr val="tx1">
+                    <a:lumMod val="95000"/>
+                  </a:schemeClr>
+                </a:solidFill>
+              </a:rPr>
+              <a:t>automation</a:t>
+            </a:r>
+            <a:r>
+              <a:rPr lang="it-IT" dirty="0">
+                <a:solidFill>
+                  <a:schemeClr val="tx1">
+                    <a:lumMod val="95000"/>
+                  </a:schemeClr>
+                </a:solidFill>
+              </a:rPr>
+              <a:t> si intende la gestione del processo di sviluppo automatica. </a:t>
+            </a:r>
+            <a:r>
+              <a:rPr lang="it-IT" dirty="0" err="1">
+                <a:solidFill>
+                  <a:schemeClr val="tx1">
+                    <a:lumMod val="95000"/>
+                  </a:schemeClr>
+                </a:solidFill>
+              </a:rPr>
+              <a:t>Maven</a:t>
+            </a:r>
+            <a:r>
+              <a:rPr lang="it-IT" dirty="0">
+                <a:solidFill>
+                  <a:schemeClr val="tx1">
+                    <a:lumMod val="95000"/>
+                  </a:schemeClr>
+                </a:solidFill>
+              </a:rPr>
+              <a:t> è il rappresentante più famoso di questa categoria di strumenti riguardo java.</a:t>
+            </a:r>
+          </a:p>
+          <a:p>
+            <a:r>
+              <a:rPr lang="it-IT" dirty="0" err="1">
+                <a:solidFill>
+                  <a:schemeClr val="tx1">
+                    <a:lumMod val="95000"/>
+                  </a:schemeClr>
+                </a:solidFill>
+              </a:rPr>
+              <a:t>Maven</a:t>
+            </a:r>
+            <a:r>
+              <a:rPr lang="it-IT" dirty="0">
+                <a:solidFill>
+                  <a:schemeClr val="tx1">
+                    <a:lumMod val="95000"/>
+                  </a:schemeClr>
+                </a:solidFill>
+              </a:rPr>
+              <a:t> permette allo sviluppatore di semplificare molti processi ripetitivi all’interno del processo di sviluppo software come la compilazione del codice sorgente in binario, il packaging dei binari, la produzione di test per garantire il corretto funzionamento, la stesura della documentazione, </a:t>
+            </a:r>
+            <a:r>
+              <a:rPr lang="it-IT" dirty="0" err="1">
+                <a:solidFill>
+                  <a:schemeClr val="tx1">
+                    <a:lumMod val="95000"/>
+                  </a:schemeClr>
+                </a:solidFill>
+              </a:rPr>
+              <a:t>deploy</a:t>
+            </a:r>
+            <a:r>
+              <a:rPr lang="it-IT" dirty="0">
+                <a:solidFill>
+                  <a:schemeClr val="tx1">
+                    <a:lumMod val="95000"/>
+                  </a:schemeClr>
+                </a:solidFill>
+              </a:rPr>
+              <a:t> su server ecc..</a:t>
+            </a:r>
+          </a:p>
+          <a:p>
+            <a:r>
+              <a:rPr lang="it-IT" dirty="0" err="1">
+                <a:solidFill>
+                  <a:schemeClr val="tx1">
+                    <a:lumMod val="95000"/>
+                  </a:schemeClr>
+                </a:solidFill>
+              </a:rPr>
+              <a:t>Maven</a:t>
+            </a:r>
+            <a:r>
+              <a:rPr lang="it-IT" dirty="0">
+                <a:solidFill>
+                  <a:schemeClr val="tx1">
+                    <a:lumMod val="95000"/>
+                  </a:schemeClr>
+                </a:solidFill>
+              </a:rPr>
+              <a:t> inoltre viene utilizzato spesso per la gestione delle librerie di funzioni importate nei progetti software.</a:t>
+            </a:r>
           </a:p>
         </p:txBody>
       </p:sp>
     </p:spTree>
     <p:extLst>
       <p:ext uri="{BB962C8B-B14F-4D97-AF65-F5344CB8AC3E}">
-        <p14:creationId xmlns:p14="http://schemas.microsoft.com/office/powerpoint/2010/main" val="4257515683"/>
+        <p14:creationId xmlns:p14="http://schemas.microsoft.com/office/powerpoint/2010/main" val="1384120757"/>
       </p:ext>
     </p:extLst>
   </p:cSld>
@@ -32973,19 +34526,14 @@
         </p:spPr>
         <p:txBody>
           <a:bodyPr>
-            <a:normAutofit fontScale="90000"/>
+            <a:normAutofit/>
           </a:bodyPr>
           <a:lstStyle/>
           <a:p>
             <a:r>
               <a:rPr lang="it-IT" sz="4100" dirty="0"/>
-              <a:t>Concetti filosofici ed operativi della </a:t>
-            </a:r>
-            <a:r>
-              <a:rPr lang="it-IT" sz="4100" dirty="0" err="1"/>
-              <a:t>oop</a:t>
-            </a:r>
-            <a:endParaRPr lang="it-IT" sz="4100" dirty="0"/>
+              <a:t>Installazione e configurazione di java</a:t>
+            </a:r>
           </a:p>
         </p:txBody>
       </p:sp>
@@ -33007,22 +34555,239 @@
         </p:nvSpPr>
         <p:spPr>
           <a:xfrm>
-            <a:off x="1876425" y="1555124"/>
-            <a:ext cx="9515826" cy="4115834"/>
+            <a:off x="1876423" y="1371083"/>
+            <a:ext cx="5371665" cy="4115834"/>
           </a:xfrm>
         </p:spPr>
         <p:txBody>
           <a:bodyPr/>
           <a:lstStyle/>
           <a:p>
-            <a:endParaRPr lang="it-IT"/>
+            <a:r>
+              <a:rPr lang="it-IT" dirty="0">
+                <a:solidFill>
+                  <a:schemeClr val="tx1">
+                    <a:lumMod val="95000"/>
+                  </a:schemeClr>
+                </a:solidFill>
+              </a:rPr>
+              <a:t>per installare java dobbiamo:</a:t>
+            </a:r>
+          </a:p>
+          <a:p>
+            <a:pPr marL="342900" indent="-342900">
+              <a:buFont typeface="Arial" panose="020B0604020202020204" pitchFamily="34" charset="0"/>
+              <a:buChar char="•"/>
+            </a:pPr>
+            <a:r>
+              <a:rPr lang="it-IT" dirty="0">
+                <a:solidFill>
+                  <a:schemeClr val="tx1">
+                    <a:lumMod val="95000"/>
+                  </a:schemeClr>
+                </a:solidFill>
+              </a:rPr>
+              <a:t>Installare il </a:t>
+            </a:r>
+            <a:r>
+              <a:rPr lang="it-IT" dirty="0" err="1">
+                <a:solidFill>
+                  <a:schemeClr val="tx1">
+                    <a:lumMod val="95000"/>
+                  </a:schemeClr>
+                </a:solidFill>
+              </a:rPr>
+              <a:t>jre</a:t>
+            </a:r>
+            <a:endParaRPr lang="it-IT" dirty="0">
+              <a:solidFill>
+                <a:schemeClr val="tx1">
+                  <a:lumMod val="95000"/>
+                </a:schemeClr>
+              </a:solidFill>
+            </a:endParaRPr>
+          </a:p>
+          <a:p>
+            <a:pPr marL="342900" indent="-342900">
+              <a:buFont typeface="Arial" panose="020B0604020202020204" pitchFamily="34" charset="0"/>
+              <a:buChar char="•"/>
+            </a:pPr>
+            <a:r>
+              <a:rPr lang="it-IT" dirty="0">
+                <a:solidFill>
+                  <a:schemeClr val="tx1">
+                    <a:lumMod val="95000"/>
+                  </a:schemeClr>
+                </a:solidFill>
+              </a:rPr>
+              <a:t>Installare il </a:t>
+            </a:r>
+            <a:r>
+              <a:rPr lang="it-IT" dirty="0" err="1">
+                <a:solidFill>
+                  <a:schemeClr val="tx1">
+                    <a:lumMod val="95000"/>
+                  </a:schemeClr>
+                </a:solidFill>
+              </a:rPr>
+              <a:t>jdk</a:t>
+            </a:r>
+            <a:endParaRPr lang="it-IT" dirty="0">
+              <a:solidFill>
+                <a:schemeClr val="tx1">
+                  <a:lumMod val="95000"/>
+                </a:schemeClr>
+              </a:solidFill>
+            </a:endParaRPr>
+          </a:p>
+          <a:p>
+            <a:pPr marL="342900" indent="-342900">
+              <a:buFont typeface="Arial" panose="020B0604020202020204" pitchFamily="34" charset="0"/>
+              <a:buChar char="•"/>
+            </a:pPr>
+            <a:r>
+              <a:rPr lang="it-IT" dirty="0">
+                <a:solidFill>
+                  <a:schemeClr val="tx1">
+                    <a:lumMod val="95000"/>
+                  </a:schemeClr>
+                </a:solidFill>
+              </a:rPr>
+              <a:t>Assicurarci che le variabili di ambiente siano impostate correttamente (</a:t>
+            </a:r>
+            <a:r>
+              <a:rPr lang="it-IT" dirty="0">
+                <a:solidFill>
+                  <a:schemeClr val="tx1">
+                    <a:lumMod val="95000"/>
+                  </a:schemeClr>
+                </a:solidFill>
+                <a:hlinkClick r:id="rId2"/>
+              </a:rPr>
+              <a:t>https://www.java.com/</a:t>
+            </a:r>
+            <a:r>
+              <a:rPr lang="it-IT" dirty="0" err="1">
+                <a:solidFill>
+                  <a:schemeClr val="tx1">
+                    <a:lumMod val="95000"/>
+                  </a:schemeClr>
+                </a:solidFill>
+                <a:hlinkClick r:id="rId2"/>
+              </a:rPr>
+              <a:t>it</a:t>
+            </a:r>
+            <a:r>
+              <a:rPr lang="it-IT" dirty="0">
+                <a:solidFill>
+                  <a:schemeClr val="tx1">
+                    <a:lumMod val="95000"/>
+                  </a:schemeClr>
+                </a:solidFill>
+                <a:hlinkClick r:id="rId2"/>
+              </a:rPr>
+              <a:t>/download/help/path_it.html</a:t>
+            </a:r>
+            <a:r>
+              <a:rPr lang="it-IT" dirty="0">
+                <a:solidFill>
+                  <a:schemeClr val="tx1">
+                    <a:lumMod val="95000"/>
+                  </a:schemeClr>
+                </a:solidFill>
+              </a:rPr>
+              <a:t>)</a:t>
+            </a:r>
+          </a:p>
+          <a:p>
+            <a:pPr marL="342900" indent="-342900">
+              <a:buFont typeface="Arial" panose="020B0604020202020204" pitchFamily="34" charset="0"/>
+              <a:buChar char="•"/>
+            </a:pPr>
+            <a:r>
+              <a:rPr lang="it-IT" dirty="0">
+                <a:solidFill>
+                  <a:schemeClr val="tx1">
+                    <a:lumMod val="95000"/>
+                  </a:schemeClr>
+                </a:solidFill>
+              </a:rPr>
+              <a:t>Installazione </a:t>
+            </a:r>
+            <a:r>
+              <a:rPr lang="it-IT" dirty="0" err="1">
+                <a:solidFill>
+                  <a:schemeClr val="tx1">
+                    <a:lumMod val="95000"/>
+                  </a:schemeClr>
+                </a:solidFill>
+              </a:rPr>
+              <a:t>eclipse</a:t>
+            </a:r>
+            <a:r>
+              <a:rPr lang="it-IT" dirty="0">
+                <a:solidFill>
+                  <a:schemeClr val="tx1">
+                    <a:lumMod val="95000"/>
+                  </a:schemeClr>
+                </a:solidFill>
+              </a:rPr>
+              <a:t>: https://www.eclipse.org/downloads/</a:t>
+            </a:r>
           </a:p>
         </p:txBody>
       </p:sp>
+      <p:pic>
+        <p:nvPicPr>
+          <p:cNvPr id="1028" name="Picture 4" descr="variabili d'ambiente windows 10 Archivi - Giovanni Raffaele Marchese">
+            <a:extLst>
+              <a:ext uri="{FF2B5EF4-FFF2-40B4-BE49-F238E27FC236}">
+                <a16:creationId xmlns:a16="http://schemas.microsoft.com/office/drawing/2014/main" id="{0E5715EA-181C-489A-B03D-60C7079EE60A}"/>
+              </a:ext>
+            </a:extLst>
+          </p:cNvPr>
+          <p:cNvPicPr>
+            <a:picLocks noChangeAspect="1" noChangeArrowheads="1"/>
+          </p:cNvPicPr>
+          <p:nvPr/>
+        </p:nvPicPr>
+        <p:blipFill>
+          <a:blip r:embed="rId3">
+            <a:extLst>
+              <a:ext uri="{28A0092B-C50C-407E-A947-70E740481C1C}">
+                <a14:useLocalDpi xmlns:a14="http://schemas.microsoft.com/office/drawing/2010/main" val="0"/>
+              </a:ext>
+            </a:extLst>
+          </a:blip>
+          <a:srcRect/>
+          <a:stretch>
+            <a:fillRect/>
+          </a:stretch>
+        </p:blipFill>
+        <p:spPr bwMode="auto">
+          <a:xfrm>
+            <a:off x="7764808" y="1371082"/>
+            <a:ext cx="3988168" cy="4115835"/>
+          </a:xfrm>
+          <a:prstGeom prst="rect">
+            <a:avLst/>
+          </a:prstGeom>
+          <a:noFill/>
+          <a:extLst>
+            <a:ext uri="{909E8E84-426E-40DD-AFC4-6F175D3DCCD1}">
+              <a14:hiddenFill xmlns:a14="http://schemas.microsoft.com/office/drawing/2010/main">
+                <a:solidFill>
+                  <a:srgbClr val="FFFFFF"/>
+                </a:solidFill>
+              </a14:hiddenFill>
+            </a:ext>
+          </a:extLst>
+        </p:spPr>
+      </p:pic>
     </p:spTree>
     <p:extLst>
       <p:ext uri="{BB962C8B-B14F-4D97-AF65-F5344CB8AC3E}">
-        <p14:creationId xmlns:p14="http://schemas.microsoft.com/office/powerpoint/2010/main" val="2747472894"/>
+        <p14:creationId xmlns:p14="http://schemas.microsoft.com/office/powerpoint/2010/main" val="4257515683"/>
       </p:ext>
     </p:extLst>
   </p:cSld>
@@ -33073,14 +34838,19 @@
         </p:spPr>
         <p:txBody>
           <a:bodyPr>
-            <a:noAutofit/>
+            <a:normAutofit fontScale="90000"/>
           </a:bodyPr>
           <a:lstStyle/>
           <a:p>
             <a:r>
-              <a:rPr lang="it-IT" sz="4300" dirty="0"/>
-              <a:t>Cos’è un costrutto</a:t>
-            </a:r>
+              <a:rPr lang="it-IT" sz="4100" dirty="0"/>
+              <a:t>Concetti filosofici ed operativi della </a:t>
+            </a:r>
+            <a:r>
+              <a:rPr lang="it-IT" sz="4100" dirty="0" err="1"/>
+              <a:t>oop</a:t>
+            </a:r>
+            <a:endParaRPr lang="it-IT" sz="4100" dirty="0"/>
           </a:p>
         </p:txBody>
       </p:sp>
@@ -33107,17 +34877,76 @@
           </a:xfrm>
         </p:spPr>
         <p:txBody>
-          <a:bodyPr/>
+          <a:bodyPr>
+            <a:normAutofit fontScale="77500" lnSpcReduction="20000"/>
+          </a:bodyPr>
           <a:lstStyle/>
           <a:p>
-            <a:endParaRPr lang="it-IT"/>
+            <a:r>
+              <a:rPr lang="it-IT" dirty="0">
+                <a:solidFill>
+                  <a:schemeClr val="tx1">
+                    <a:lumMod val="95000"/>
+                  </a:schemeClr>
+                </a:solidFill>
+              </a:rPr>
+              <a:t>Come sottolineato nelle precedenti lezioni, la programmazione orientata agli oggetti, non solo una tipologia di linguaggi di programmazione, bensì è proprio un modo di pensare, un modo di vedere la realtà attraverso il punto di vista della macchina.</a:t>
+            </a:r>
+          </a:p>
+          <a:p>
+            <a:r>
+              <a:rPr lang="it-IT" dirty="0">
+                <a:solidFill>
+                  <a:schemeClr val="tx1">
+                    <a:lumMod val="95000"/>
+                  </a:schemeClr>
+                </a:solidFill>
+              </a:rPr>
+              <a:t>Punto chiave della OOP è proprio la rappresentazione di una realtà attraverso degli oggetti che possiedono caratteristiche chiamate attributi e funzionalità chiamate metodi.</a:t>
+            </a:r>
+          </a:p>
+          <a:p>
+            <a:r>
+              <a:rPr lang="it-IT" dirty="0">
+                <a:solidFill>
+                  <a:schemeClr val="tx1">
+                    <a:lumMod val="95000"/>
+                  </a:schemeClr>
+                </a:solidFill>
+              </a:rPr>
+              <a:t>Il programma viene visto come la simulazione da parte della macchina di un dato comportamento derivato dal mondo reale.</a:t>
+            </a:r>
+          </a:p>
+          <a:p>
+            <a:r>
+              <a:rPr lang="it-IT" dirty="0">
+                <a:solidFill>
+                  <a:schemeClr val="tx1">
+                    <a:lumMod val="95000"/>
+                  </a:schemeClr>
+                </a:solidFill>
+              </a:rPr>
+              <a:t>Pensiamo al compito di un bibliotecario quindi della gestione dei libri noleggiati ecc.. E proviamo a rappresentarlo attraverso degli oggetti che simulano lo stesso comportamento. </a:t>
+            </a:r>
+          </a:p>
+          <a:p>
+            <a:r>
+              <a:rPr lang="it-IT" dirty="0">
+                <a:solidFill>
+                  <a:schemeClr val="tx1">
+                    <a:lumMod val="95000"/>
+                  </a:schemeClr>
+                </a:solidFill>
+              </a:rPr>
+              <a:t>L’orientamento agli oggetti possiamo dire che suggerisce di far corrispondere il codice alle situazioni di vita reale, il codice quindi dovrebbe portare lo stesso nome, le stesse caratteristiche ecc..</a:t>
+            </a:r>
           </a:p>
         </p:txBody>
       </p:sp>
     </p:spTree>
     <p:extLst>
       <p:ext uri="{BB962C8B-B14F-4D97-AF65-F5344CB8AC3E}">
-        <p14:creationId xmlns:p14="http://schemas.microsoft.com/office/powerpoint/2010/main" val="1249408230"/>
+        <p14:creationId xmlns:p14="http://schemas.microsoft.com/office/powerpoint/2010/main" val="2747472894"/>
       </p:ext>
     </p:extLst>
   </p:cSld>
@@ -33174,7 +35003,7 @@
           <a:p>
             <a:r>
               <a:rPr lang="it-IT" sz="4300" dirty="0"/>
-              <a:t>Struttura di un programma java</a:t>
+              <a:t>Cos’è un costrutto</a:t>
             </a:r>
           </a:p>
         </p:txBody>
@@ -33202,17 +35031,161 @@
           </a:xfrm>
         </p:spPr>
         <p:txBody>
-          <a:bodyPr/>
+          <a:bodyPr>
+            <a:normAutofit fontScale="85000" lnSpcReduction="10000"/>
+          </a:bodyPr>
           <a:lstStyle/>
           <a:p>
-            <a:endParaRPr lang="it-IT"/>
+            <a:r>
+              <a:rPr lang="it-IT" dirty="0">
+                <a:solidFill>
+                  <a:schemeClr val="tx1">
+                    <a:lumMod val="95000"/>
+                  </a:schemeClr>
+                </a:solidFill>
+              </a:rPr>
+              <a:t>Il termine costrutto in java è utilizzato per identificare un blocco logico di codice.</a:t>
+            </a:r>
+          </a:p>
+          <a:p>
+            <a:r>
+              <a:rPr lang="it-IT" dirty="0">
+                <a:solidFill>
+                  <a:schemeClr val="tx1">
+                    <a:lumMod val="95000"/>
+                  </a:schemeClr>
+                </a:solidFill>
+              </a:rPr>
+              <a:t>Questo blocco logico di codice spesso rappresenta in formato di codice delle strutture di controllo del flusso basate sui concetti di selezione ed iterazione e le loro varianti.</a:t>
+            </a:r>
+          </a:p>
+          <a:p>
+            <a:r>
+              <a:rPr lang="it-IT" dirty="0">
+                <a:solidFill>
+                  <a:schemeClr val="tx1">
+                    <a:lumMod val="95000"/>
+                  </a:schemeClr>
+                </a:solidFill>
+              </a:rPr>
+              <a:t>Il costrutto più famoso potrebbe essere considerato quello rappresentante la selezione a due vie, ovvero </a:t>
+            </a:r>
+            <a:r>
+              <a:rPr lang="it-IT" dirty="0" err="1">
+                <a:solidFill>
+                  <a:schemeClr val="tx1">
+                    <a:lumMod val="95000"/>
+                  </a:schemeClr>
+                </a:solidFill>
+              </a:rPr>
+              <a:t>if</a:t>
+            </a:r>
+            <a:r>
+              <a:rPr lang="it-IT" dirty="0">
+                <a:solidFill>
+                  <a:schemeClr val="tx1">
+                    <a:lumMod val="95000"/>
+                  </a:schemeClr>
+                </a:solidFill>
+              </a:rPr>
+              <a:t> … else … :</a:t>
+            </a:r>
+          </a:p>
+          <a:p>
+            <a:r>
+              <a:rPr lang="it-IT" dirty="0">
+                <a:solidFill>
+                  <a:schemeClr val="tx1">
+                    <a:lumMod val="95000"/>
+                  </a:schemeClr>
+                </a:solidFill>
+              </a:rPr>
+              <a:t>	</a:t>
+            </a:r>
+            <a:r>
+              <a:rPr lang="it-IT" dirty="0" err="1">
+                <a:solidFill>
+                  <a:schemeClr val="tx1">
+                    <a:lumMod val="95000"/>
+                  </a:schemeClr>
+                </a:solidFill>
+              </a:rPr>
+              <a:t>If</a:t>
+            </a:r>
+            <a:r>
+              <a:rPr lang="it-IT" dirty="0">
+                <a:solidFill>
+                  <a:schemeClr val="tx1">
+                    <a:lumMod val="95000"/>
+                  </a:schemeClr>
+                </a:solidFill>
+              </a:rPr>
+              <a:t>(condizione){</a:t>
+            </a:r>
+          </a:p>
+          <a:p>
+            <a:r>
+              <a:rPr lang="it-IT" dirty="0">
+                <a:solidFill>
+                  <a:schemeClr val="tx1">
+                    <a:lumMod val="95000"/>
+                  </a:schemeClr>
+                </a:solidFill>
+              </a:rPr>
+              <a:t>		svolgiamo il blocco codice contenuto tra le graffe</a:t>
+            </a:r>
+          </a:p>
+          <a:p>
+            <a:r>
+              <a:rPr lang="it-IT" dirty="0">
+                <a:solidFill>
+                  <a:schemeClr val="tx1">
+                    <a:lumMod val="95000"/>
+                  </a:schemeClr>
+                </a:solidFill>
+              </a:rPr>
+              <a:t>	}else{</a:t>
+            </a:r>
+          </a:p>
+          <a:p>
+            <a:r>
+              <a:rPr lang="it-IT" dirty="0">
+                <a:solidFill>
+                  <a:schemeClr val="tx1">
+                    <a:lumMod val="95000"/>
+                  </a:schemeClr>
+                </a:solidFill>
+              </a:rPr>
+              <a:t>		svolgiamo un altro blocco di codice alternativo</a:t>
+            </a:r>
+          </a:p>
+          <a:p>
+            <a:r>
+              <a:rPr lang="it-IT" dirty="0">
+                <a:solidFill>
+                  <a:schemeClr val="tx1">
+                    <a:lumMod val="95000"/>
+                  </a:schemeClr>
+                </a:solidFill>
+              </a:rPr>
+              <a:t>	}</a:t>
+            </a:r>
+          </a:p>
+          <a:p>
+            <a:endParaRPr lang="it-IT" dirty="0">
+              <a:solidFill>
+                <a:schemeClr val="tx1">
+                  <a:lumMod val="95000"/>
+                </a:schemeClr>
+              </a:solidFill>
+            </a:endParaRPr>
           </a:p>
         </p:txBody>
       </p:sp>
     </p:spTree>
     <p:extLst>
       <p:ext uri="{BB962C8B-B14F-4D97-AF65-F5344CB8AC3E}">
-        <p14:creationId xmlns:p14="http://schemas.microsoft.com/office/powerpoint/2010/main" val="753287515"/>
+        <p14:creationId xmlns:p14="http://schemas.microsoft.com/office/powerpoint/2010/main" val="1249408230"/>
       </p:ext>
     </p:extLst>
   </p:cSld>
@@ -33269,7 +35242,7 @@
           <a:p>
             <a:r>
               <a:rPr lang="it-IT" sz="4300" dirty="0"/>
-              <a:t>L’oggetto</a:t>
+              <a:t>Struttura di un programma java</a:t>
             </a:r>
           </a:p>
         </p:txBody>
@@ -33293,21 +35266,83 @@
         <p:spPr>
           <a:xfrm>
             <a:off x="1876425" y="1555124"/>
-            <a:ext cx="9515826" cy="4115834"/>
+            <a:ext cx="3241675" cy="4236076"/>
           </a:xfrm>
         </p:spPr>
         <p:txBody>
-          <a:bodyPr/>
+          <a:bodyPr>
+            <a:normAutofit fontScale="92500" lnSpcReduction="10000"/>
+          </a:bodyPr>
           <a:lstStyle/>
           <a:p>
-            <a:endParaRPr lang="it-IT"/>
+            <a:pPr algn="just"/>
+            <a:r>
+              <a:rPr lang="it-IT" dirty="0">
+                <a:solidFill>
+                  <a:schemeClr val="tx1">
+                    <a:lumMod val="95000"/>
+                  </a:schemeClr>
+                </a:solidFill>
+              </a:rPr>
+              <a:t>Un programma in java consiste nella definizione di un insieme di file .java ognuno nominato con il nome della classe contenuta al suo interno ed un file chiamato Main.java contenente un metodo </a:t>
+            </a:r>
+            <a:r>
+              <a:rPr lang="it-IT" dirty="0" err="1">
+                <a:solidFill>
+                  <a:schemeClr val="tx1">
+                    <a:lumMod val="95000"/>
+                  </a:schemeClr>
+                </a:solidFill>
+              </a:rPr>
+              <a:t>main</a:t>
+            </a:r>
+            <a:r>
+              <a:rPr lang="it-IT" dirty="0">
+                <a:solidFill>
+                  <a:schemeClr val="tx1">
+                    <a:lumMod val="95000"/>
+                  </a:schemeClr>
+                </a:solidFill>
+              </a:rPr>
+              <a:t> nel quale viene descritto lo svolgimento del programma.</a:t>
+            </a:r>
           </a:p>
         </p:txBody>
       </p:sp>
+      <p:pic>
+        <p:nvPicPr>
+          <p:cNvPr id="5" name="Immagine 4">
+            <a:extLst>
+              <a:ext uri="{FF2B5EF4-FFF2-40B4-BE49-F238E27FC236}">
+                <a16:creationId xmlns:a16="http://schemas.microsoft.com/office/drawing/2014/main" id="{C5D4ECC5-31C5-43A3-85F2-B139C87407EE}"/>
+              </a:ext>
+            </a:extLst>
+          </p:cNvPr>
+          <p:cNvPicPr>
+            <a:picLocks noChangeAspect="1"/>
+          </p:cNvPicPr>
+          <p:nvPr/>
+        </p:nvPicPr>
+        <p:blipFill>
+          <a:blip r:embed="rId2"/>
+          <a:stretch>
+            <a:fillRect/>
+          </a:stretch>
+        </p:blipFill>
+        <p:spPr>
+          <a:xfrm>
+            <a:off x="5791200" y="1367405"/>
+            <a:ext cx="5731078" cy="5077423"/>
+          </a:xfrm>
+          <a:prstGeom prst="rect">
+            <a:avLst/>
+          </a:prstGeom>
+        </p:spPr>
+      </p:pic>
     </p:spTree>
     <p:extLst>
       <p:ext uri="{BB962C8B-B14F-4D97-AF65-F5344CB8AC3E}">
-        <p14:creationId xmlns:p14="http://schemas.microsoft.com/office/powerpoint/2010/main" val="3658727395"/>
+        <p14:creationId xmlns:p14="http://schemas.microsoft.com/office/powerpoint/2010/main" val="753287515"/>
       </p:ext>
     </p:extLst>
   </p:cSld>
@@ -33334,75 +35369,40 @@
           <a:chExt cx="0" cy="0"/>
         </a:xfrm>
       </p:grpSpPr>
-      <p:sp>
-        <p:nvSpPr>
-          <p:cNvPr id="2" name="Titolo 1">
+      <p:pic>
+        <p:nvPicPr>
+          <p:cNvPr id="2" name="Immagine 1">
             <a:extLst>
               <a:ext uri="{FF2B5EF4-FFF2-40B4-BE49-F238E27FC236}">
-                <a16:creationId xmlns:a16="http://schemas.microsoft.com/office/drawing/2014/main" id="{A6CF85A1-E457-4832-BCB1-61021474450D}"/>
+                <a16:creationId xmlns:a16="http://schemas.microsoft.com/office/drawing/2014/main" id="{EA583795-76FF-4534-AE28-B29C0ABBD864}"/>
               </a:ext>
             </a:extLst>
           </p:cNvPr>
-          <p:cNvSpPr>
-            <a:spLocks noGrp="1"/>
-          </p:cNvSpPr>
-          <p:nvPr>
-            <p:ph type="ctrTitle"/>
-          </p:nvPr>
-        </p:nvSpPr>
+          <p:cNvPicPr>
+            <a:picLocks noChangeAspect="1"/>
+          </p:cNvPicPr>
+          <p:nvPr/>
+        </p:nvPicPr>
+        <p:blipFill>
+          <a:blip r:embed="rId2"/>
+          <a:stretch>
+            <a:fillRect/>
+          </a:stretch>
+        </p:blipFill>
         <p:spPr>
           <a:xfrm>
-            <a:off x="1876423" y="711302"/>
-            <a:ext cx="10103055" cy="656103"/>
+            <a:off x="2062061" y="380602"/>
+            <a:ext cx="8067878" cy="6096795"/>
           </a:xfrm>
+          <a:prstGeom prst="rect">
+            <a:avLst/>
+          </a:prstGeom>
         </p:spPr>
-        <p:txBody>
-          <a:bodyPr>
-            <a:noAutofit/>
-          </a:bodyPr>
-          <a:lstStyle/>
-          <a:p>
-            <a:r>
-              <a:rPr lang="it-IT" sz="4300" dirty="0"/>
-              <a:t>La classe</a:t>
-            </a:r>
-          </a:p>
-        </p:txBody>
-      </p:sp>
-      <p:sp>
-        <p:nvSpPr>
-          <p:cNvPr id="3" name="Sottotitolo 2">
-            <a:extLst>
-              <a:ext uri="{FF2B5EF4-FFF2-40B4-BE49-F238E27FC236}">
-                <a16:creationId xmlns:a16="http://schemas.microsoft.com/office/drawing/2014/main" id="{66409AAA-04C6-4E69-9F24-FBCFD422D4E8}"/>
-              </a:ext>
-            </a:extLst>
-          </p:cNvPr>
-          <p:cNvSpPr>
-            <a:spLocks noGrp="1"/>
-          </p:cNvSpPr>
-          <p:nvPr>
-            <p:ph type="subTitle" idx="1"/>
-          </p:nvPr>
-        </p:nvSpPr>
-        <p:spPr>
-          <a:xfrm>
-            <a:off x="1876425" y="1555124"/>
-            <a:ext cx="9515826" cy="4115834"/>
-          </a:xfrm>
-        </p:spPr>
-        <p:txBody>
-          <a:bodyPr/>
-          <a:lstStyle/>
-          <a:p>
-            <a:endParaRPr lang="it-IT"/>
-          </a:p>
-        </p:txBody>
-      </p:sp>
+      </p:pic>
     </p:spTree>
     <p:extLst>
       <p:ext uri="{BB962C8B-B14F-4D97-AF65-F5344CB8AC3E}">
-        <p14:creationId xmlns:p14="http://schemas.microsoft.com/office/powerpoint/2010/main" val="3928124443"/>
+        <p14:creationId xmlns:p14="http://schemas.microsoft.com/office/powerpoint/2010/main" val="3509556786"/>
       </p:ext>
     </p:extLst>
   </p:cSld>
@@ -33459,7 +35459,7 @@
           <a:p>
             <a:r>
               <a:rPr lang="it-IT" sz="4300" dirty="0"/>
-              <a:t>Il metodo</a:t>
+              <a:t>L’oggetto</a:t>
             </a:r>
           </a:p>
         </p:txBody>
@@ -33490,14 +35490,56 @@
           <a:bodyPr/>
           <a:lstStyle/>
           <a:p>
-            <a:endParaRPr lang="it-IT"/>
+            <a:r>
+              <a:rPr lang="it-IT" dirty="0">
+                <a:solidFill>
+                  <a:schemeClr val="tx1">
+                    <a:lumMod val="95000"/>
+                  </a:schemeClr>
+                </a:solidFill>
+              </a:rPr>
+              <a:t>L’oggetto in java come abbiamo detto in precedenza è un istanza di una classe.</a:t>
+            </a:r>
+          </a:p>
+          <a:p>
+            <a:r>
+              <a:rPr lang="it-IT" dirty="0">
+                <a:solidFill>
+                  <a:schemeClr val="tx1">
+                    <a:lumMod val="95000"/>
+                  </a:schemeClr>
+                </a:solidFill>
+              </a:rPr>
+              <a:t>Per poter costruire istanze di una classe è necessario avvalersi di un metodo chiamato costruttore.</a:t>
+            </a:r>
+          </a:p>
+          <a:p>
+            <a:r>
+              <a:rPr lang="it-IT" dirty="0">
+                <a:solidFill>
+                  <a:schemeClr val="tx1">
+                    <a:lumMod val="95000"/>
+                  </a:schemeClr>
+                </a:solidFill>
+              </a:rPr>
+              <a:t>Il metodo costruttore creerà l’entità corrispondente alla classe e la istanzierà in memoria, pronta per essere utilizzata.</a:t>
+            </a:r>
+          </a:p>
+          <a:p>
+            <a:endParaRPr lang="it-IT" dirty="0">
+              <a:solidFill>
+                <a:schemeClr val="tx1">
+                  <a:lumMod val="95000"/>
+                </a:schemeClr>
+              </a:solidFill>
+            </a:endParaRPr>
           </a:p>
         </p:txBody>
       </p:sp>
     </p:spTree>
     <p:extLst>
       <p:ext uri="{BB962C8B-B14F-4D97-AF65-F5344CB8AC3E}">
-        <p14:creationId xmlns:p14="http://schemas.microsoft.com/office/powerpoint/2010/main" val="2082263039"/>
+        <p14:creationId xmlns:p14="http://schemas.microsoft.com/office/powerpoint/2010/main" val="3658727395"/>
       </p:ext>
     </p:extLst>
   </p:cSld>
@@ -33524,75 +35566,142 @@
           <a:chExt cx="0" cy="0"/>
         </a:xfrm>
       </p:grpSpPr>
+      <p:pic>
+        <p:nvPicPr>
+          <p:cNvPr id="3" name="Immagine 2">
+            <a:extLst>
+              <a:ext uri="{FF2B5EF4-FFF2-40B4-BE49-F238E27FC236}">
+                <a16:creationId xmlns:a16="http://schemas.microsoft.com/office/drawing/2014/main" id="{C342FD5D-4907-42BE-83FB-6BE282A940D7}"/>
+              </a:ext>
+            </a:extLst>
+          </p:cNvPr>
+          <p:cNvPicPr>
+            <a:picLocks noChangeAspect="1"/>
+          </p:cNvPicPr>
+          <p:nvPr/>
+        </p:nvPicPr>
+        <p:blipFill>
+          <a:blip r:embed="rId2"/>
+          <a:stretch>
+            <a:fillRect/>
+          </a:stretch>
+        </p:blipFill>
+        <p:spPr>
+          <a:xfrm>
+            <a:off x="2214021" y="1401630"/>
+            <a:ext cx="7763958" cy="1895740"/>
+          </a:xfrm>
+          <a:prstGeom prst="rect">
+            <a:avLst/>
+          </a:prstGeom>
+        </p:spPr>
+      </p:pic>
       <p:sp>
         <p:nvSpPr>
-          <p:cNvPr id="2" name="Titolo 1">
+          <p:cNvPr id="4" name="CasellaDiTesto 3">
             <a:extLst>
               <a:ext uri="{FF2B5EF4-FFF2-40B4-BE49-F238E27FC236}">
-                <a16:creationId xmlns:a16="http://schemas.microsoft.com/office/drawing/2014/main" id="{A6CF85A1-E457-4832-BCB1-61021474450D}"/>
+                <a16:creationId xmlns:a16="http://schemas.microsoft.com/office/drawing/2014/main" id="{C2FE311F-018B-4BEF-BDC5-89809F5EAE84}"/>
               </a:ext>
             </a:extLst>
           </p:cNvPr>
-          <p:cNvSpPr>
-            <a:spLocks noGrp="1"/>
-          </p:cNvSpPr>
-          <p:nvPr>
-            <p:ph type="ctrTitle"/>
-          </p:nvPr>
+          <p:cNvSpPr txBox="1"/>
+          <p:nvPr/>
         </p:nvSpPr>
         <p:spPr>
           <a:xfrm>
-            <a:off x="1876423" y="711302"/>
-            <a:ext cx="10103055" cy="656103"/>
+            <a:off x="4808534" y="755930"/>
+            <a:ext cx="2527300" cy="461665"/>
           </a:xfrm>
+          <a:prstGeom prst="rect">
+            <a:avLst/>
+          </a:prstGeom>
+          <a:noFill/>
         </p:spPr>
         <p:txBody>
-          <a:bodyPr>
-            <a:noAutofit/>
+          <a:bodyPr wrap="square" rtlCol="0">
+            <a:spAutoFit/>
           </a:bodyPr>
           <a:lstStyle/>
           <a:p>
-            <a:r>
-              <a:rPr lang="it-IT" sz="4300" dirty="0"/>
-              <a:t>Il metodo costruttore</a:t>
+            <a:pPr algn="ctr"/>
+            <a:r>
+              <a:rPr lang="it-IT" sz="2400" dirty="0"/>
+              <a:t>Costruttore (r5-7)</a:t>
             </a:r>
           </a:p>
         </p:txBody>
       </p:sp>
       <p:sp>
         <p:nvSpPr>
-          <p:cNvPr id="3" name="Sottotitolo 2">
+          <p:cNvPr id="5" name="CasellaDiTesto 4">
             <a:extLst>
               <a:ext uri="{FF2B5EF4-FFF2-40B4-BE49-F238E27FC236}">
-                <a16:creationId xmlns:a16="http://schemas.microsoft.com/office/drawing/2014/main" id="{66409AAA-04C6-4E69-9F24-FBCFD422D4E8}"/>
+                <a16:creationId xmlns:a16="http://schemas.microsoft.com/office/drawing/2014/main" id="{1A1242E5-2E90-46E8-99AC-E881ED15F828}"/>
               </a:ext>
             </a:extLst>
           </p:cNvPr>
-          <p:cNvSpPr>
-            <a:spLocks noGrp="1"/>
-          </p:cNvSpPr>
-          <p:nvPr>
-            <p:ph type="subTitle" idx="1"/>
-          </p:nvPr>
+          <p:cNvSpPr txBox="1"/>
+          <p:nvPr/>
         </p:nvSpPr>
         <p:spPr>
           <a:xfrm>
-            <a:off x="1876425" y="1555124"/>
-            <a:ext cx="9515826" cy="4115834"/>
+            <a:off x="4425950" y="3441700"/>
+            <a:ext cx="3340100" cy="461665"/>
           </a:xfrm>
+          <a:prstGeom prst="rect">
+            <a:avLst/>
+          </a:prstGeom>
+          <a:noFill/>
         </p:spPr>
         <p:txBody>
-          <a:bodyPr/>
+          <a:bodyPr wrap="square" rtlCol="0">
+            <a:spAutoFit/>
+          </a:bodyPr>
           <a:lstStyle/>
           <a:p>
-            <a:endParaRPr lang="it-IT"/>
+            <a:pPr algn="ctr"/>
+            <a:r>
+              <a:rPr lang="it-IT" sz="2400" dirty="0"/>
+              <a:t>Creazione istanza (r8)</a:t>
+            </a:r>
           </a:p>
         </p:txBody>
       </p:sp>
+      <p:pic>
+        <p:nvPicPr>
+          <p:cNvPr id="7" name="Immagine 6">
+            <a:extLst>
+              <a:ext uri="{FF2B5EF4-FFF2-40B4-BE49-F238E27FC236}">
+                <a16:creationId xmlns:a16="http://schemas.microsoft.com/office/drawing/2014/main" id="{F59BA8B6-72AC-4474-AE19-F647B020EED6}"/>
+              </a:ext>
+            </a:extLst>
+          </p:cNvPr>
+          <p:cNvPicPr>
+            <a:picLocks noChangeAspect="1"/>
+          </p:cNvPicPr>
+          <p:nvPr/>
+        </p:nvPicPr>
+        <p:blipFill>
+          <a:blip r:embed="rId3"/>
+          <a:stretch>
+            <a:fillRect/>
+          </a:stretch>
+        </p:blipFill>
+        <p:spPr>
+          <a:xfrm>
+            <a:off x="2166389" y="4022295"/>
+            <a:ext cx="7811590" cy="2076740"/>
+          </a:xfrm>
+          <a:prstGeom prst="rect">
+            <a:avLst/>
+          </a:prstGeom>
+        </p:spPr>
+      </p:pic>
     </p:spTree>
     <p:extLst>
       <p:ext uri="{BB962C8B-B14F-4D97-AF65-F5344CB8AC3E}">
-        <p14:creationId xmlns:p14="http://schemas.microsoft.com/office/powerpoint/2010/main" val="4016853456"/>
+        <p14:creationId xmlns:p14="http://schemas.microsoft.com/office/powerpoint/2010/main" val="433312686"/>
       </p:ext>
     </p:extLst>
   </p:cSld>
@@ -33649,7 +35758,7 @@
           <a:p>
             <a:r>
               <a:rPr lang="it-IT" sz="4300" dirty="0"/>
-              <a:t>Utilizzo delle classi di libreria</a:t>
+              <a:t>La classe</a:t>
             </a:r>
           </a:p>
         </p:txBody>
@@ -33673,21 +35782,86 @@
         <p:spPr>
           <a:xfrm>
             <a:off x="1876425" y="1555124"/>
-            <a:ext cx="9515826" cy="4115834"/>
+            <a:ext cx="9515826" cy="1353176"/>
           </a:xfrm>
         </p:spPr>
         <p:txBody>
-          <a:bodyPr/>
+          <a:bodyPr>
+            <a:normAutofit fontScale="77500" lnSpcReduction="20000"/>
+          </a:bodyPr>
           <a:lstStyle/>
           <a:p>
-            <a:endParaRPr lang="it-IT"/>
+            <a:r>
+              <a:rPr lang="it-IT" dirty="0">
+                <a:solidFill>
+                  <a:schemeClr val="tx1">
+                    <a:lumMod val="95000"/>
+                  </a:schemeClr>
+                </a:solidFill>
+              </a:rPr>
+              <a:t>La classe come detto in precedenza è uno strumento che ci permette di definire le componenti che dovranno essere contenute in ogni sua istanza.</a:t>
+            </a:r>
+          </a:p>
+          <a:p>
+            <a:r>
+              <a:rPr lang="it-IT" dirty="0">
+                <a:solidFill>
+                  <a:schemeClr val="tx1">
+                    <a:lumMod val="95000"/>
+                  </a:schemeClr>
+                </a:solidFill>
+              </a:rPr>
+              <a:t>Di seguito un esempio in codice:</a:t>
+            </a:r>
+          </a:p>
+          <a:p>
+            <a:r>
+              <a:rPr lang="it-IT" dirty="0">
+                <a:solidFill>
+                  <a:schemeClr val="tx1">
+                    <a:lumMod val="95000"/>
+                  </a:schemeClr>
+                </a:solidFill>
+              </a:rPr>
+              <a:t> </a:t>
+            </a:r>
           </a:p>
         </p:txBody>
       </p:sp>
+      <p:pic>
+        <p:nvPicPr>
+          <p:cNvPr id="5" name="Immagine 4">
+            <a:extLst>
+              <a:ext uri="{FF2B5EF4-FFF2-40B4-BE49-F238E27FC236}">
+                <a16:creationId xmlns:a16="http://schemas.microsoft.com/office/drawing/2014/main" id="{7F68465E-A86E-4386-AA20-6E5A671184A6}"/>
+              </a:ext>
+            </a:extLst>
+          </p:cNvPr>
+          <p:cNvPicPr>
+            <a:picLocks noChangeAspect="1"/>
+          </p:cNvPicPr>
+          <p:nvPr/>
+        </p:nvPicPr>
+        <p:blipFill>
+          <a:blip r:embed="rId2"/>
+          <a:stretch>
+            <a:fillRect/>
+          </a:stretch>
+        </p:blipFill>
+        <p:spPr>
+          <a:xfrm>
+            <a:off x="3021705" y="2628901"/>
+            <a:ext cx="6148590" cy="3658844"/>
+          </a:xfrm>
+          <a:prstGeom prst="rect">
+            <a:avLst/>
+          </a:prstGeom>
+        </p:spPr>
+      </p:pic>
     </p:spTree>
     <p:extLst>
       <p:ext uri="{BB962C8B-B14F-4D97-AF65-F5344CB8AC3E}">
-        <p14:creationId xmlns:p14="http://schemas.microsoft.com/office/powerpoint/2010/main" val="737883181"/>
+        <p14:creationId xmlns:p14="http://schemas.microsoft.com/office/powerpoint/2010/main" val="3928124443"/>
       </p:ext>
     </p:extLst>
   </p:cSld>
@@ -33744,7 +35918,7 @@
           <a:p>
             <a:r>
               <a:rPr lang="it-IT" sz="4300" dirty="0"/>
-              <a:t>Import e concetto di package</a:t>
+              <a:t>Il metodo</a:t>
             </a:r>
           </a:p>
         </p:txBody>
@@ -33768,21 +35942,81 @@
         <p:spPr>
           <a:xfrm>
             <a:off x="1876425" y="1555124"/>
-            <a:ext cx="9515826" cy="4115834"/>
+            <a:ext cx="9515826" cy="1759576"/>
           </a:xfrm>
         </p:spPr>
         <p:txBody>
           <a:bodyPr/>
           <a:lstStyle/>
           <a:p>
-            <a:endParaRPr lang="it-IT"/>
+            <a:r>
+              <a:rPr lang="it-IT" dirty="0">
+                <a:solidFill>
+                  <a:schemeClr val="tx1">
+                    <a:lumMod val="95000"/>
+                  </a:schemeClr>
+                </a:solidFill>
+              </a:rPr>
+              <a:t>Il metodo appartenente ad una classe è utilizzato per esprimere una funzionalità dell’oggetto.</a:t>
+            </a:r>
+          </a:p>
+          <a:p>
+            <a:r>
+              <a:rPr lang="it-IT" dirty="0">
+                <a:solidFill>
+                  <a:schemeClr val="tx1">
+                    <a:lumMod val="95000"/>
+                  </a:schemeClr>
+                </a:solidFill>
+              </a:rPr>
+              <a:t>Esempio: Il cane cammina avanti, indietro, destra, sinistra</a:t>
+            </a:r>
+          </a:p>
+          <a:p>
+            <a:endParaRPr lang="it-IT" dirty="0">
+              <a:solidFill>
+                <a:schemeClr val="tx1">
+                  <a:lumMod val="95000"/>
+                </a:schemeClr>
+              </a:solidFill>
+            </a:endParaRPr>
           </a:p>
         </p:txBody>
       </p:sp>
+      <p:pic>
+        <p:nvPicPr>
+          <p:cNvPr id="5" name="Immagine 4">
+            <a:extLst>
+              <a:ext uri="{FF2B5EF4-FFF2-40B4-BE49-F238E27FC236}">
+                <a16:creationId xmlns:a16="http://schemas.microsoft.com/office/drawing/2014/main" id="{29E1DDBA-9DAC-4C48-9B9E-0A47C3AD8112}"/>
+              </a:ext>
+            </a:extLst>
+          </p:cNvPr>
+          <p:cNvPicPr>
+            <a:picLocks noChangeAspect="1"/>
+          </p:cNvPicPr>
+          <p:nvPr/>
+        </p:nvPicPr>
+        <p:blipFill>
+          <a:blip r:embed="rId2"/>
+          <a:stretch>
+            <a:fillRect/>
+          </a:stretch>
+        </p:blipFill>
+        <p:spPr>
+          <a:xfrm>
+            <a:off x="907292" y="3429000"/>
+            <a:ext cx="10860016" cy="2343477"/>
+          </a:xfrm>
+          <a:prstGeom prst="rect">
+            <a:avLst/>
+          </a:prstGeom>
+        </p:spPr>
+      </p:pic>
     </p:spTree>
     <p:extLst>
       <p:ext uri="{BB962C8B-B14F-4D97-AF65-F5344CB8AC3E}">
-        <p14:creationId xmlns:p14="http://schemas.microsoft.com/office/powerpoint/2010/main" val="2033361500"/>
+        <p14:creationId xmlns:p14="http://schemas.microsoft.com/office/powerpoint/2010/main" val="2082263039"/>
       </p:ext>
     </p:extLst>
   </p:cSld>
@@ -33814,7 +36048,7 @@
           <p:cNvPr id="2" name="Titolo 1">
             <a:extLst>
               <a:ext uri="{FF2B5EF4-FFF2-40B4-BE49-F238E27FC236}">
-                <a16:creationId xmlns:a16="http://schemas.microsoft.com/office/drawing/2014/main" id="{C6753786-AD29-4A88-AC1C-11AC3057D22C}"/>
+                <a16:creationId xmlns:a16="http://schemas.microsoft.com/office/drawing/2014/main" id="{A6CF85A1-E457-4832-BCB1-61021474450D}"/>
               </a:ext>
             </a:extLst>
           </p:cNvPr>
@@ -33825,15 +36059,21 @@
             <p:ph type="ctrTitle"/>
           </p:nvPr>
         </p:nvSpPr>
-        <p:spPr/>
+        <p:spPr>
+          <a:xfrm>
+            <a:off x="1876423" y="711302"/>
+            <a:ext cx="10103055" cy="656103"/>
+          </a:xfrm>
+        </p:spPr>
         <p:txBody>
-          <a:bodyPr/>
+          <a:bodyPr>
+            <a:noAutofit/>
+          </a:bodyPr>
           <a:lstStyle/>
           <a:p>
-            <a:pPr algn="r"/>
-            <a:r>
-              <a:rPr lang="it-IT" dirty="0"/>
-              <a:t>Unit 3</a:t>
+            <a:r>
+              <a:rPr lang="it-IT" sz="4300" dirty="0"/>
+              <a:t>Il metodo costruttore</a:t>
             </a:r>
           </a:p>
         </p:txBody>
@@ -33843,7 +36083,7 @@
           <p:cNvPr id="3" name="Sottotitolo 2">
             <a:extLst>
               <a:ext uri="{FF2B5EF4-FFF2-40B4-BE49-F238E27FC236}">
-                <a16:creationId xmlns:a16="http://schemas.microsoft.com/office/drawing/2014/main" id="{E3812A85-7B93-4D44-9999-B5293FB9C3EA}"/>
+                <a16:creationId xmlns:a16="http://schemas.microsoft.com/office/drawing/2014/main" id="{66409AAA-04C6-4E69-9F24-FBCFD422D4E8}"/>
               </a:ext>
             </a:extLst>
           </p:cNvPr>
@@ -33854,41 +36094,49 @@
             <p:ph type="subTitle" idx="1"/>
           </p:nvPr>
         </p:nvSpPr>
-        <p:spPr/>
+        <p:spPr>
+          <a:xfrm>
+            <a:off x="1876425" y="1555124"/>
+            <a:ext cx="9515826" cy="4115834"/>
+          </a:xfrm>
+        </p:spPr>
         <p:txBody>
           <a:bodyPr/>
           <a:lstStyle/>
           <a:p>
-            <a:pPr algn="r"/>
-            <a:r>
-              <a:rPr lang="it-IT" dirty="0">
-                <a:solidFill>
-                  <a:schemeClr val="tx1">
-                    <a:lumMod val="95000"/>
-                  </a:schemeClr>
-                </a:solidFill>
-              </a:rPr>
-              <a:t>Linguaggi di programmazione, la </a:t>
-            </a:r>
-            <a:r>
-              <a:rPr lang="it-IT" dirty="0" err="1">
-                <a:solidFill>
-                  <a:schemeClr val="tx1">
-                    <a:lumMod val="95000"/>
-                  </a:schemeClr>
-                </a:solidFill>
-              </a:rPr>
-              <a:t>oop</a:t>
-            </a:r>
-            <a:r>
-              <a:rPr lang="it-IT" dirty="0">
-                <a:solidFill>
-                  <a:schemeClr val="tx1">
-                    <a:lumMod val="95000"/>
-                  </a:schemeClr>
-                </a:solidFill>
-              </a:rPr>
-              <a:t> e java parte 2</a:t>
+            <a:r>
+              <a:rPr lang="it-IT" dirty="0">
+                <a:solidFill>
+                  <a:schemeClr val="tx1">
+                    <a:lumMod val="95000"/>
+                  </a:schemeClr>
+                </a:solidFill>
+              </a:rPr>
+              <a:t>Il costruttore è un particolare metodo che si occupa di creare una copia della classe a cui appartiene.</a:t>
+            </a:r>
+          </a:p>
+          <a:p>
+            <a:r>
+              <a:rPr lang="it-IT" dirty="0">
+                <a:solidFill>
+                  <a:schemeClr val="tx1">
+                    <a:lumMod val="95000"/>
+                  </a:schemeClr>
+                </a:solidFill>
+              </a:rPr>
+              <a:t>Di norma il costruttore di una classe viene definito assegnandogli il nome della classe che a sua volta viene assegnato di norma uguale al nome del file.</a:t>
+            </a:r>
+          </a:p>
+          <a:p>
+            <a:r>
+              <a:rPr lang="it-IT" dirty="0">
+                <a:solidFill>
+                  <a:schemeClr val="tx1">
+                    <a:lumMod val="95000"/>
+                  </a:schemeClr>
+                </a:solidFill>
+              </a:rPr>
+              <a:t>Una classe può possedere diversi costruttori in base al tipo di inizializzazione che vogliamo utilizzare.</a:t>
             </a:r>
           </a:p>
         </p:txBody>
@@ -33896,7 +36144,7 @@
     </p:spTree>
     <p:extLst>
       <p:ext uri="{BB962C8B-B14F-4D97-AF65-F5344CB8AC3E}">
-        <p14:creationId xmlns:p14="http://schemas.microsoft.com/office/powerpoint/2010/main" val="1034672837"/>
+        <p14:creationId xmlns:p14="http://schemas.microsoft.com/office/powerpoint/2010/main" val="4016853456"/>
       </p:ext>
     </p:extLst>
   </p:cSld>

</xml_diff>